<commit_message>
TW edits to text and diagram - round 2
</commit_message>
<xml_diff>
--- a/guide/content/images/abi-crowdstrike-architecture-diagram.pptx
+++ b/guide/content/images/abi-crowdstrike-architecture-diagram.pptx
@@ -2,19 +2,19 @@
 <file path=ppt/presentation.xml><?xml version="1.0" encoding="utf-8"?>
 <p:presentation xmlns:a="http://schemas.openxmlformats.org/drawingml/2006/main" xmlns:r="http://schemas.openxmlformats.org/officeDocument/2006/relationships" xmlns:p="http://schemas.openxmlformats.org/presentationml/2006/main" saveSubsetFonts="1" autoCompressPictures="0">
   <p:sldMasterIdLst>
-    <p:sldMasterId id="2147483648" r:id="rId1"/>
+    <p:sldMasterId id="2147483660" r:id="rId1"/>
   </p:sldMasterIdLst>
   <p:sldIdLst>
     <p:sldId id="257" r:id="rId2"/>
     <p:sldId id="258" r:id="rId3"/>
   </p:sldIdLst>
-  <p:sldSz cx="12192000" cy="6858000"/>
+  <p:sldSz cx="14173200" cy="6858000"/>
   <p:notesSz cx="6858000" cy="9144000"/>
   <p:defaultTextStyle>
     <a:defPPr>
       <a:defRPr lang="en-US"/>
     </a:defPPr>
-    <a:lvl1pPr marL="0" algn="l" defTabSz="914400" rtl="0" eaLnBrk="1" latinLnBrk="0" hangingPunct="1">
+    <a:lvl1pPr marL="0" algn="l" defTabSz="457200" rtl="0" eaLnBrk="1" latinLnBrk="0" hangingPunct="1">
       <a:defRPr sz="1800" kern="1200">
         <a:solidFill>
           <a:schemeClr val="tx1"/>
@@ -24,7 +24,7 @@
         <a:cs typeface="+mn-cs"/>
       </a:defRPr>
     </a:lvl1pPr>
-    <a:lvl2pPr marL="457200" algn="l" defTabSz="914400" rtl="0" eaLnBrk="1" latinLnBrk="0" hangingPunct="1">
+    <a:lvl2pPr marL="457200" algn="l" defTabSz="457200" rtl="0" eaLnBrk="1" latinLnBrk="0" hangingPunct="1">
       <a:defRPr sz="1800" kern="1200">
         <a:solidFill>
           <a:schemeClr val="tx1"/>
@@ -34,7 +34,7 @@
         <a:cs typeface="+mn-cs"/>
       </a:defRPr>
     </a:lvl2pPr>
-    <a:lvl3pPr marL="914400" algn="l" defTabSz="914400" rtl="0" eaLnBrk="1" latinLnBrk="0" hangingPunct="1">
+    <a:lvl3pPr marL="914400" algn="l" defTabSz="457200" rtl="0" eaLnBrk="1" latinLnBrk="0" hangingPunct="1">
       <a:defRPr sz="1800" kern="1200">
         <a:solidFill>
           <a:schemeClr val="tx1"/>
@@ -44,7 +44,7 @@
         <a:cs typeface="+mn-cs"/>
       </a:defRPr>
     </a:lvl3pPr>
-    <a:lvl4pPr marL="1371600" algn="l" defTabSz="914400" rtl="0" eaLnBrk="1" latinLnBrk="0" hangingPunct="1">
+    <a:lvl4pPr marL="1371600" algn="l" defTabSz="457200" rtl="0" eaLnBrk="1" latinLnBrk="0" hangingPunct="1">
       <a:defRPr sz="1800" kern="1200">
         <a:solidFill>
           <a:schemeClr val="tx1"/>
@@ -54,7 +54,7 @@
         <a:cs typeface="+mn-cs"/>
       </a:defRPr>
     </a:lvl4pPr>
-    <a:lvl5pPr marL="1828800" algn="l" defTabSz="914400" rtl="0" eaLnBrk="1" latinLnBrk="0" hangingPunct="1">
+    <a:lvl5pPr marL="1828800" algn="l" defTabSz="457200" rtl="0" eaLnBrk="1" latinLnBrk="0" hangingPunct="1">
       <a:defRPr sz="1800" kern="1200">
         <a:solidFill>
           <a:schemeClr val="tx1"/>
@@ -64,7 +64,7 @@
         <a:cs typeface="+mn-cs"/>
       </a:defRPr>
     </a:lvl5pPr>
-    <a:lvl6pPr marL="2286000" algn="l" defTabSz="914400" rtl="0" eaLnBrk="1" latinLnBrk="0" hangingPunct="1">
+    <a:lvl6pPr marL="2286000" algn="l" defTabSz="457200" rtl="0" eaLnBrk="1" latinLnBrk="0" hangingPunct="1">
       <a:defRPr sz="1800" kern="1200">
         <a:solidFill>
           <a:schemeClr val="tx1"/>
@@ -74,7 +74,7 @@
         <a:cs typeface="+mn-cs"/>
       </a:defRPr>
     </a:lvl6pPr>
-    <a:lvl7pPr marL="2743200" algn="l" defTabSz="914400" rtl="0" eaLnBrk="1" latinLnBrk="0" hangingPunct="1">
+    <a:lvl7pPr marL="2743200" algn="l" defTabSz="457200" rtl="0" eaLnBrk="1" latinLnBrk="0" hangingPunct="1">
       <a:defRPr sz="1800" kern="1200">
         <a:solidFill>
           <a:schemeClr val="tx1"/>
@@ -84,7 +84,7 @@
         <a:cs typeface="+mn-cs"/>
       </a:defRPr>
     </a:lvl7pPr>
-    <a:lvl8pPr marL="3200400" algn="l" defTabSz="914400" rtl="0" eaLnBrk="1" latinLnBrk="0" hangingPunct="1">
+    <a:lvl8pPr marL="3200400" algn="l" defTabSz="457200" rtl="0" eaLnBrk="1" latinLnBrk="0" hangingPunct="1">
       <a:defRPr sz="1800" kern="1200">
         <a:solidFill>
           <a:schemeClr val="tx1"/>
@@ -94,7 +94,7 @@
         <a:cs typeface="+mn-cs"/>
       </a:defRPr>
     </a:lvl8pPr>
-    <a:lvl9pPr marL="3657600" algn="l" defTabSz="914400" rtl="0" eaLnBrk="1" latinLnBrk="0" hangingPunct="1">
+    <a:lvl9pPr marL="3657600" algn="l" defTabSz="457200" rtl="0" eaLnBrk="1" latinLnBrk="0" hangingPunct="1">
       <a:defRPr sz="1800" kern="1200">
         <a:solidFill>
           <a:schemeClr val="tx1"/>
@@ -132,13 +132,7 @@
       </p:grpSpPr>
       <p:sp>
         <p:nvSpPr>
-          <p:cNvPr id="2" name="Title 1">
-            <a:extLst>
-              <a:ext uri="{FF2B5EF4-FFF2-40B4-BE49-F238E27FC236}">
-                <a16:creationId xmlns:a16="http://schemas.microsoft.com/office/drawing/2014/main" id="{B5D01B4E-F782-7D13-63AC-15C08F7FEED0}"/>
-              </a:ext>
-            </a:extLst>
-          </p:cNvPr>
+          <p:cNvPr id="2" name="Title 1"/>
           <p:cNvSpPr>
             <a:spLocks noGrp="1"/>
           </p:cNvSpPr>
@@ -148,8 +142,8 @@
         </p:nvSpPr>
         <p:spPr>
           <a:xfrm>
-            <a:off x="1524000" y="1122363"/>
-            <a:ext cx="9144000" cy="2387600"/>
+            <a:off x="1771650" y="1122363"/>
+            <a:ext cx="10629900" cy="2387600"/>
           </a:xfrm>
         </p:spPr>
         <p:txBody>
@@ -164,18 +158,13 @@
               <a:rPr lang="en-US"/>
               <a:t>Click to edit Master title style</a:t>
             </a:r>
+            <a:endParaRPr lang="en-US" dirty="0"/>
           </a:p>
         </p:txBody>
       </p:sp>
       <p:sp>
         <p:nvSpPr>
-          <p:cNvPr id="3" name="Subtitle 2">
-            <a:extLst>
-              <a:ext uri="{FF2B5EF4-FFF2-40B4-BE49-F238E27FC236}">
-                <a16:creationId xmlns:a16="http://schemas.microsoft.com/office/drawing/2014/main" id="{4707BE10-02E2-8232-0ACE-4960BF08B41F}"/>
-              </a:ext>
-            </a:extLst>
-          </p:cNvPr>
+          <p:cNvPr id="3" name="Subtitle 2"/>
           <p:cNvSpPr>
             <a:spLocks noGrp="1"/>
           </p:cNvSpPr>
@@ -185,8 +174,8 @@
         </p:nvSpPr>
         <p:spPr>
           <a:xfrm>
-            <a:off x="1524000" y="3602038"/>
-            <a:ext cx="9144000" cy="1655762"/>
+            <a:off x="1771650" y="3602038"/>
+            <a:ext cx="10629900" cy="1655762"/>
           </a:xfrm>
         </p:spPr>
         <p:txBody>
@@ -234,18 +223,13 @@
               <a:rPr lang="en-US"/>
               <a:t>Click to edit Master subtitle style</a:t>
             </a:r>
+            <a:endParaRPr lang="en-US" dirty="0"/>
           </a:p>
         </p:txBody>
       </p:sp>
       <p:sp>
         <p:nvSpPr>
-          <p:cNvPr id="4" name="Date Placeholder 3">
-            <a:extLst>
-              <a:ext uri="{FF2B5EF4-FFF2-40B4-BE49-F238E27FC236}">
-                <a16:creationId xmlns:a16="http://schemas.microsoft.com/office/drawing/2014/main" id="{F2C0AA78-36C3-F4C7-6E51-30CC8287EE0E}"/>
-              </a:ext>
-            </a:extLst>
-          </p:cNvPr>
+          <p:cNvPr id="4" name="Date Placeholder 3"/>
           <p:cNvSpPr>
             <a:spLocks noGrp="1"/>
           </p:cNvSpPr>
@@ -260,7 +244,7 @@
           <a:p>
             <a:fld id="{CB924714-913E-5C48-97C6-641C2CDBA41D}" type="datetimeFigureOut">
               <a:rPr lang="en-US" smtClean="0"/>
-              <a:t>6/12/2023</a:t>
+              <a:t>6/15/2023</a:t>
             </a:fld>
             <a:endParaRPr lang="en-US" dirty="0"/>
           </a:p>
@@ -268,13 +252,7 @@
       </p:sp>
       <p:sp>
         <p:nvSpPr>
-          <p:cNvPr id="5" name="Footer Placeholder 4">
-            <a:extLst>
-              <a:ext uri="{FF2B5EF4-FFF2-40B4-BE49-F238E27FC236}">
-                <a16:creationId xmlns:a16="http://schemas.microsoft.com/office/drawing/2014/main" id="{C9516DE3-23E2-E8A9-0D66-908EA4865897}"/>
-              </a:ext>
-            </a:extLst>
-          </p:cNvPr>
+          <p:cNvPr id="5" name="Footer Placeholder 4"/>
           <p:cNvSpPr>
             <a:spLocks noGrp="1"/>
           </p:cNvSpPr>
@@ -293,13 +271,7 @@
       </p:sp>
       <p:sp>
         <p:nvSpPr>
-          <p:cNvPr id="6" name="Slide Number Placeholder 5">
-            <a:extLst>
-              <a:ext uri="{FF2B5EF4-FFF2-40B4-BE49-F238E27FC236}">
-                <a16:creationId xmlns:a16="http://schemas.microsoft.com/office/drawing/2014/main" id="{E85960B7-430A-C156-32D6-E87798BBADE2}"/>
-              </a:ext>
-            </a:extLst>
-          </p:cNvPr>
+          <p:cNvPr id="6" name="Slide Number Placeholder 5"/>
           <p:cNvSpPr>
             <a:spLocks noGrp="1"/>
           </p:cNvSpPr>
@@ -323,7 +295,7 @@
     </p:spTree>
     <p:extLst>
       <p:ext uri="{BB962C8B-B14F-4D97-AF65-F5344CB8AC3E}">
-        <p14:creationId xmlns:p14="http://schemas.microsoft.com/office/powerpoint/2010/main" val="269454147"/>
+        <p14:creationId xmlns:p14="http://schemas.microsoft.com/office/powerpoint/2010/main" val="879666017"/>
       </p:ext>
     </p:extLst>
   </p:cSld>
@@ -352,13 +324,7 @@
       </p:grpSpPr>
       <p:sp>
         <p:nvSpPr>
-          <p:cNvPr id="2" name="Title 1">
-            <a:extLst>
-              <a:ext uri="{FF2B5EF4-FFF2-40B4-BE49-F238E27FC236}">
-                <a16:creationId xmlns:a16="http://schemas.microsoft.com/office/drawing/2014/main" id="{668455FD-5752-3761-03B6-4B9C0630BF97}"/>
-              </a:ext>
-            </a:extLst>
-          </p:cNvPr>
+          <p:cNvPr id="2" name="Title 1"/>
           <p:cNvSpPr>
             <a:spLocks noGrp="1"/>
           </p:cNvSpPr>
@@ -375,18 +341,13 @@
               <a:rPr lang="en-US"/>
               <a:t>Click to edit Master title style</a:t>
             </a:r>
+            <a:endParaRPr lang="en-US" dirty="0"/>
           </a:p>
         </p:txBody>
       </p:sp>
       <p:sp>
         <p:nvSpPr>
-          <p:cNvPr id="3" name="Vertical Text Placeholder 2">
-            <a:extLst>
-              <a:ext uri="{FF2B5EF4-FFF2-40B4-BE49-F238E27FC236}">
-                <a16:creationId xmlns:a16="http://schemas.microsoft.com/office/drawing/2014/main" id="{9EB61FAB-190E-4728-10E0-72EA5B2F9EC8}"/>
-              </a:ext>
-            </a:extLst>
-          </p:cNvPr>
+          <p:cNvPr id="3" name="Vertical Text Placeholder 2"/>
           <p:cNvSpPr>
             <a:spLocks noGrp="1"/>
           </p:cNvSpPr>
@@ -402,7 +363,7 @@
             <a:pPr lvl="0"/>
             <a:r>
               <a:rPr lang="en-US"/>
-              <a:t>Click to edit Master text styles</a:t>
+              <a:t>Edit Master text styles</a:t>
             </a:r>
           </a:p>
           <a:p>
@@ -432,18 +393,13 @@
               <a:rPr lang="en-US"/>
               <a:t>Fifth level</a:t>
             </a:r>
+            <a:endParaRPr lang="en-US" dirty="0"/>
           </a:p>
         </p:txBody>
       </p:sp>
       <p:sp>
         <p:nvSpPr>
-          <p:cNvPr id="4" name="Date Placeholder 3">
-            <a:extLst>
-              <a:ext uri="{FF2B5EF4-FFF2-40B4-BE49-F238E27FC236}">
-                <a16:creationId xmlns:a16="http://schemas.microsoft.com/office/drawing/2014/main" id="{40EAAA33-1D8B-2642-6D40-A3771CBAA63F}"/>
-              </a:ext>
-            </a:extLst>
-          </p:cNvPr>
+          <p:cNvPr id="4" name="Date Placeholder 3"/>
           <p:cNvSpPr>
             <a:spLocks noGrp="1"/>
           </p:cNvSpPr>
@@ -458,7 +414,7 @@
           <a:p>
             <a:fld id="{CB924714-913E-5C48-97C6-641C2CDBA41D}" type="datetimeFigureOut">
               <a:rPr lang="en-US" smtClean="0"/>
-              <a:t>6/12/2023</a:t>
+              <a:t>6/15/2023</a:t>
             </a:fld>
             <a:endParaRPr lang="en-US" dirty="0"/>
           </a:p>
@@ -466,13 +422,7 @@
       </p:sp>
       <p:sp>
         <p:nvSpPr>
-          <p:cNvPr id="5" name="Footer Placeholder 4">
-            <a:extLst>
-              <a:ext uri="{FF2B5EF4-FFF2-40B4-BE49-F238E27FC236}">
-                <a16:creationId xmlns:a16="http://schemas.microsoft.com/office/drawing/2014/main" id="{5FF83E3D-EE37-EC14-2FB1-63000CA9A75F}"/>
-              </a:ext>
-            </a:extLst>
-          </p:cNvPr>
+          <p:cNvPr id="5" name="Footer Placeholder 4"/>
           <p:cNvSpPr>
             <a:spLocks noGrp="1"/>
           </p:cNvSpPr>
@@ -491,13 +441,7 @@
       </p:sp>
       <p:sp>
         <p:nvSpPr>
-          <p:cNvPr id="6" name="Slide Number Placeholder 5">
-            <a:extLst>
-              <a:ext uri="{FF2B5EF4-FFF2-40B4-BE49-F238E27FC236}">
-                <a16:creationId xmlns:a16="http://schemas.microsoft.com/office/drawing/2014/main" id="{C18FAC7C-3AF3-6859-DCFC-A88C793C0D08}"/>
-              </a:ext>
-            </a:extLst>
-          </p:cNvPr>
+          <p:cNvPr id="6" name="Slide Number Placeholder 5"/>
           <p:cNvSpPr>
             <a:spLocks noGrp="1"/>
           </p:cNvSpPr>
@@ -521,7 +465,7 @@
     </p:spTree>
     <p:extLst>
       <p:ext uri="{BB962C8B-B14F-4D97-AF65-F5344CB8AC3E}">
-        <p14:creationId xmlns:p14="http://schemas.microsoft.com/office/powerpoint/2010/main" val="2373921953"/>
+        <p14:creationId xmlns:p14="http://schemas.microsoft.com/office/powerpoint/2010/main" val="373909915"/>
       </p:ext>
     </p:extLst>
   </p:cSld>
@@ -550,13 +494,7 @@
       </p:grpSpPr>
       <p:sp>
         <p:nvSpPr>
-          <p:cNvPr id="2" name="Vertical Title 1">
-            <a:extLst>
-              <a:ext uri="{FF2B5EF4-FFF2-40B4-BE49-F238E27FC236}">
-                <a16:creationId xmlns:a16="http://schemas.microsoft.com/office/drawing/2014/main" id="{2A8D40EF-3445-6ACD-6D73-46391C6E3B5F}"/>
-              </a:ext>
-            </a:extLst>
-          </p:cNvPr>
+          <p:cNvPr id="2" name="Vertical Title 1"/>
           <p:cNvSpPr>
             <a:spLocks noGrp="1"/>
           </p:cNvSpPr>
@@ -566,8 +504,8 @@
         </p:nvSpPr>
         <p:spPr>
           <a:xfrm>
-            <a:off x="8724900" y="365125"/>
-            <a:ext cx="2628900" cy="5811838"/>
+            <a:off x="10142696" y="365125"/>
+            <a:ext cx="3056096" cy="5811838"/>
           </a:xfrm>
         </p:spPr>
         <p:txBody>
@@ -578,18 +516,13 @@
               <a:rPr lang="en-US"/>
               <a:t>Click to edit Master title style</a:t>
             </a:r>
+            <a:endParaRPr lang="en-US" dirty="0"/>
           </a:p>
         </p:txBody>
       </p:sp>
       <p:sp>
         <p:nvSpPr>
-          <p:cNvPr id="3" name="Vertical Text Placeholder 2">
-            <a:extLst>
-              <a:ext uri="{FF2B5EF4-FFF2-40B4-BE49-F238E27FC236}">
-                <a16:creationId xmlns:a16="http://schemas.microsoft.com/office/drawing/2014/main" id="{41E7A655-7261-145C-1269-ABD1CBCC9892}"/>
-              </a:ext>
-            </a:extLst>
-          </p:cNvPr>
+          <p:cNvPr id="3" name="Vertical Text Placeholder 2"/>
           <p:cNvSpPr>
             <a:spLocks noGrp="1"/>
           </p:cNvSpPr>
@@ -599,8 +532,8 @@
         </p:nvSpPr>
         <p:spPr>
           <a:xfrm>
-            <a:off x="838200" y="365125"/>
-            <a:ext cx="7734300" cy="5811838"/>
+            <a:off x="974407" y="365125"/>
+            <a:ext cx="8991124" cy="5811838"/>
           </a:xfrm>
         </p:spPr>
         <p:txBody>
@@ -610,7 +543,7 @@
             <a:pPr lvl="0"/>
             <a:r>
               <a:rPr lang="en-US"/>
-              <a:t>Click to edit Master text styles</a:t>
+              <a:t>Edit Master text styles</a:t>
             </a:r>
           </a:p>
           <a:p>
@@ -640,18 +573,13 @@
               <a:rPr lang="en-US"/>
               <a:t>Fifth level</a:t>
             </a:r>
+            <a:endParaRPr lang="en-US" dirty="0"/>
           </a:p>
         </p:txBody>
       </p:sp>
       <p:sp>
         <p:nvSpPr>
-          <p:cNvPr id="4" name="Date Placeholder 3">
-            <a:extLst>
-              <a:ext uri="{FF2B5EF4-FFF2-40B4-BE49-F238E27FC236}">
-                <a16:creationId xmlns:a16="http://schemas.microsoft.com/office/drawing/2014/main" id="{A8D478B4-6634-7227-F464-B68D9DA26183}"/>
-              </a:ext>
-            </a:extLst>
-          </p:cNvPr>
+          <p:cNvPr id="4" name="Date Placeholder 3"/>
           <p:cNvSpPr>
             <a:spLocks noGrp="1"/>
           </p:cNvSpPr>
@@ -666,7 +594,7 @@
           <a:p>
             <a:fld id="{CB924714-913E-5C48-97C6-641C2CDBA41D}" type="datetimeFigureOut">
               <a:rPr lang="en-US" smtClean="0"/>
-              <a:t>6/12/2023</a:t>
+              <a:t>6/15/2023</a:t>
             </a:fld>
             <a:endParaRPr lang="en-US" dirty="0"/>
           </a:p>
@@ -674,13 +602,7 @@
       </p:sp>
       <p:sp>
         <p:nvSpPr>
-          <p:cNvPr id="5" name="Footer Placeholder 4">
-            <a:extLst>
-              <a:ext uri="{FF2B5EF4-FFF2-40B4-BE49-F238E27FC236}">
-                <a16:creationId xmlns:a16="http://schemas.microsoft.com/office/drawing/2014/main" id="{25C849DC-8891-12A0-654E-991EB875C186}"/>
-              </a:ext>
-            </a:extLst>
-          </p:cNvPr>
+          <p:cNvPr id="5" name="Footer Placeholder 4"/>
           <p:cNvSpPr>
             <a:spLocks noGrp="1"/>
           </p:cNvSpPr>
@@ -699,13 +621,7 @@
       </p:sp>
       <p:sp>
         <p:nvSpPr>
-          <p:cNvPr id="6" name="Slide Number Placeholder 5">
-            <a:extLst>
-              <a:ext uri="{FF2B5EF4-FFF2-40B4-BE49-F238E27FC236}">
-                <a16:creationId xmlns:a16="http://schemas.microsoft.com/office/drawing/2014/main" id="{945FC6C4-CD91-EF12-DC03-3F5C3051FAC1}"/>
-              </a:ext>
-            </a:extLst>
-          </p:cNvPr>
+          <p:cNvPr id="6" name="Slide Number Placeholder 5"/>
           <p:cNvSpPr>
             <a:spLocks noGrp="1"/>
           </p:cNvSpPr>
@@ -729,7 +645,7 @@
     </p:spTree>
     <p:extLst>
       <p:ext uri="{BB962C8B-B14F-4D97-AF65-F5344CB8AC3E}">
-        <p14:creationId xmlns:p14="http://schemas.microsoft.com/office/powerpoint/2010/main" val="430742231"/>
+        <p14:creationId xmlns:p14="http://schemas.microsoft.com/office/powerpoint/2010/main" val="3867050211"/>
       </p:ext>
     </p:extLst>
   </p:cSld>
@@ -758,13 +674,7 @@
       </p:grpSpPr>
       <p:sp>
         <p:nvSpPr>
-          <p:cNvPr id="2" name="Title 1">
-            <a:extLst>
-              <a:ext uri="{FF2B5EF4-FFF2-40B4-BE49-F238E27FC236}">
-                <a16:creationId xmlns:a16="http://schemas.microsoft.com/office/drawing/2014/main" id="{7A2837D6-A036-4CD2-D177-00AF5033E4CD}"/>
-              </a:ext>
-            </a:extLst>
-          </p:cNvPr>
+          <p:cNvPr id="2" name="Title 1"/>
           <p:cNvSpPr>
             <a:spLocks noGrp="1"/>
           </p:cNvSpPr>
@@ -781,18 +691,13 @@
               <a:rPr lang="en-US"/>
               <a:t>Click to edit Master title style</a:t>
             </a:r>
+            <a:endParaRPr lang="en-US" dirty="0"/>
           </a:p>
         </p:txBody>
       </p:sp>
       <p:sp>
         <p:nvSpPr>
-          <p:cNvPr id="3" name="Content Placeholder 2">
-            <a:extLst>
-              <a:ext uri="{FF2B5EF4-FFF2-40B4-BE49-F238E27FC236}">
-                <a16:creationId xmlns:a16="http://schemas.microsoft.com/office/drawing/2014/main" id="{7E653400-FCA3-6407-3A31-3EFC6724B028}"/>
-              </a:ext>
-            </a:extLst>
-          </p:cNvPr>
+          <p:cNvPr id="3" name="Content Placeholder 2"/>
           <p:cNvSpPr>
             <a:spLocks noGrp="1"/>
           </p:cNvSpPr>
@@ -808,7 +713,7 @@
             <a:pPr lvl="0"/>
             <a:r>
               <a:rPr lang="en-US"/>
-              <a:t>Click to edit Master text styles</a:t>
+              <a:t>Edit Master text styles</a:t>
             </a:r>
           </a:p>
           <a:p>
@@ -838,18 +743,13 @@
               <a:rPr lang="en-US"/>
               <a:t>Fifth level</a:t>
             </a:r>
+            <a:endParaRPr lang="en-US" dirty="0"/>
           </a:p>
         </p:txBody>
       </p:sp>
       <p:sp>
         <p:nvSpPr>
-          <p:cNvPr id="4" name="Date Placeholder 3">
-            <a:extLst>
-              <a:ext uri="{FF2B5EF4-FFF2-40B4-BE49-F238E27FC236}">
-                <a16:creationId xmlns:a16="http://schemas.microsoft.com/office/drawing/2014/main" id="{16978C31-4370-CF64-B1B3-2D23BCB783C6}"/>
-              </a:ext>
-            </a:extLst>
-          </p:cNvPr>
+          <p:cNvPr id="4" name="Date Placeholder 3"/>
           <p:cNvSpPr>
             <a:spLocks noGrp="1"/>
           </p:cNvSpPr>
@@ -864,7 +764,7 @@
           <a:p>
             <a:fld id="{CB924714-913E-5C48-97C6-641C2CDBA41D}" type="datetimeFigureOut">
               <a:rPr lang="en-US" smtClean="0"/>
-              <a:t>6/12/2023</a:t>
+              <a:t>6/15/2023</a:t>
             </a:fld>
             <a:endParaRPr lang="en-US" dirty="0"/>
           </a:p>
@@ -872,13 +772,7 @@
       </p:sp>
       <p:sp>
         <p:nvSpPr>
-          <p:cNvPr id="5" name="Footer Placeholder 4">
-            <a:extLst>
-              <a:ext uri="{FF2B5EF4-FFF2-40B4-BE49-F238E27FC236}">
-                <a16:creationId xmlns:a16="http://schemas.microsoft.com/office/drawing/2014/main" id="{FF1551DE-72CD-D6FA-50AF-AA089B69D880}"/>
-              </a:ext>
-            </a:extLst>
-          </p:cNvPr>
+          <p:cNvPr id="5" name="Footer Placeholder 4"/>
           <p:cNvSpPr>
             <a:spLocks noGrp="1"/>
           </p:cNvSpPr>
@@ -897,13 +791,7 @@
       </p:sp>
       <p:sp>
         <p:nvSpPr>
-          <p:cNvPr id="6" name="Slide Number Placeholder 5">
-            <a:extLst>
-              <a:ext uri="{FF2B5EF4-FFF2-40B4-BE49-F238E27FC236}">
-                <a16:creationId xmlns:a16="http://schemas.microsoft.com/office/drawing/2014/main" id="{4073568F-D554-F041-1704-E3FF4BD95195}"/>
-              </a:ext>
-            </a:extLst>
-          </p:cNvPr>
+          <p:cNvPr id="6" name="Slide Number Placeholder 5"/>
           <p:cNvSpPr>
             <a:spLocks noGrp="1"/>
           </p:cNvSpPr>
@@ -927,7 +815,7 @@
     </p:spTree>
     <p:extLst>
       <p:ext uri="{BB962C8B-B14F-4D97-AF65-F5344CB8AC3E}">
-        <p14:creationId xmlns:p14="http://schemas.microsoft.com/office/powerpoint/2010/main" val="4058586221"/>
+        <p14:creationId xmlns:p14="http://schemas.microsoft.com/office/powerpoint/2010/main" val="1562711859"/>
       </p:ext>
     </p:extLst>
   </p:cSld>
@@ -956,13 +844,7 @@
       </p:grpSpPr>
       <p:sp>
         <p:nvSpPr>
-          <p:cNvPr id="2" name="Title 1">
-            <a:extLst>
-              <a:ext uri="{FF2B5EF4-FFF2-40B4-BE49-F238E27FC236}">
-                <a16:creationId xmlns:a16="http://schemas.microsoft.com/office/drawing/2014/main" id="{3A25E776-15BD-944D-32C0-25CA647F357E}"/>
-              </a:ext>
-            </a:extLst>
-          </p:cNvPr>
+          <p:cNvPr id="2" name="Title 1"/>
           <p:cNvSpPr>
             <a:spLocks noGrp="1"/>
           </p:cNvSpPr>
@@ -972,8 +854,8 @@
         </p:nvSpPr>
         <p:spPr>
           <a:xfrm>
-            <a:off x="831850" y="1709738"/>
-            <a:ext cx="10515600" cy="2852737"/>
+            <a:off x="967026" y="1709739"/>
+            <a:ext cx="12224385" cy="2852737"/>
           </a:xfrm>
         </p:spPr>
         <p:txBody>
@@ -988,18 +870,13 @@
               <a:rPr lang="en-US"/>
               <a:t>Click to edit Master title style</a:t>
             </a:r>
+            <a:endParaRPr lang="en-US" dirty="0"/>
           </a:p>
         </p:txBody>
       </p:sp>
       <p:sp>
         <p:nvSpPr>
-          <p:cNvPr id="3" name="Text Placeholder 2">
-            <a:extLst>
-              <a:ext uri="{FF2B5EF4-FFF2-40B4-BE49-F238E27FC236}">
-                <a16:creationId xmlns:a16="http://schemas.microsoft.com/office/drawing/2014/main" id="{5EFEFBDB-AFDE-149C-EA4F-993E3DDA3F98}"/>
-              </a:ext>
-            </a:extLst>
-          </p:cNvPr>
+          <p:cNvPr id="3" name="Text Placeholder 2"/>
           <p:cNvSpPr>
             <a:spLocks noGrp="1"/>
           </p:cNvSpPr>
@@ -1009,8 +886,8 @@
         </p:nvSpPr>
         <p:spPr>
           <a:xfrm>
-            <a:off x="831850" y="4589463"/>
-            <a:ext cx="10515600" cy="1500187"/>
+            <a:off x="967026" y="4589464"/>
+            <a:ext cx="12224385" cy="1500187"/>
           </a:xfrm>
         </p:spPr>
         <p:txBody>
@@ -1111,20 +988,14 @@
             <a:pPr lvl="0"/>
             <a:r>
               <a:rPr lang="en-US"/>
-              <a:t>Click to edit Master text styles</a:t>
+              <a:t>Edit Master text styles</a:t>
             </a:r>
           </a:p>
         </p:txBody>
       </p:sp>
       <p:sp>
         <p:nvSpPr>
-          <p:cNvPr id="4" name="Date Placeholder 3">
-            <a:extLst>
-              <a:ext uri="{FF2B5EF4-FFF2-40B4-BE49-F238E27FC236}">
-                <a16:creationId xmlns:a16="http://schemas.microsoft.com/office/drawing/2014/main" id="{C1071B14-B164-10E2-2D77-3F9586471D43}"/>
-              </a:ext>
-            </a:extLst>
-          </p:cNvPr>
+          <p:cNvPr id="4" name="Date Placeholder 3"/>
           <p:cNvSpPr>
             <a:spLocks noGrp="1"/>
           </p:cNvSpPr>
@@ -1139,7 +1010,7 @@
           <a:p>
             <a:fld id="{CB924714-913E-5C48-97C6-641C2CDBA41D}" type="datetimeFigureOut">
               <a:rPr lang="en-US" smtClean="0"/>
-              <a:t>6/12/2023</a:t>
+              <a:t>6/15/2023</a:t>
             </a:fld>
             <a:endParaRPr lang="en-US" dirty="0"/>
           </a:p>
@@ -1147,13 +1018,7 @@
       </p:sp>
       <p:sp>
         <p:nvSpPr>
-          <p:cNvPr id="5" name="Footer Placeholder 4">
-            <a:extLst>
-              <a:ext uri="{FF2B5EF4-FFF2-40B4-BE49-F238E27FC236}">
-                <a16:creationId xmlns:a16="http://schemas.microsoft.com/office/drawing/2014/main" id="{B75D3826-E3D7-43E1-5476-D770E55DEF46}"/>
-              </a:ext>
-            </a:extLst>
-          </p:cNvPr>
+          <p:cNvPr id="5" name="Footer Placeholder 4"/>
           <p:cNvSpPr>
             <a:spLocks noGrp="1"/>
           </p:cNvSpPr>
@@ -1172,13 +1037,7 @@
       </p:sp>
       <p:sp>
         <p:nvSpPr>
-          <p:cNvPr id="6" name="Slide Number Placeholder 5">
-            <a:extLst>
-              <a:ext uri="{FF2B5EF4-FFF2-40B4-BE49-F238E27FC236}">
-                <a16:creationId xmlns:a16="http://schemas.microsoft.com/office/drawing/2014/main" id="{01C0996F-9975-7B83-C617-F1603EFEC2E4}"/>
-              </a:ext>
-            </a:extLst>
-          </p:cNvPr>
+          <p:cNvPr id="6" name="Slide Number Placeholder 5"/>
           <p:cNvSpPr>
             <a:spLocks noGrp="1"/>
           </p:cNvSpPr>
@@ -1202,7 +1061,7 @@
     </p:spTree>
     <p:extLst>
       <p:ext uri="{BB962C8B-B14F-4D97-AF65-F5344CB8AC3E}">
-        <p14:creationId xmlns:p14="http://schemas.microsoft.com/office/powerpoint/2010/main" val="3280224305"/>
+        <p14:creationId xmlns:p14="http://schemas.microsoft.com/office/powerpoint/2010/main" val="774927702"/>
       </p:ext>
     </p:extLst>
   </p:cSld>
@@ -1231,13 +1090,7 @@
       </p:grpSpPr>
       <p:sp>
         <p:nvSpPr>
-          <p:cNvPr id="2" name="Title 1">
-            <a:extLst>
-              <a:ext uri="{FF2B5EF4-FFF2-40B4-BE49-F238E27FC236}">
-                <a16:creationId xmlns:a16="http://schemas.microsoft.com/office/drawing/2014/main" id="{55A0389A-F64D-60C2-0F4B-A53B3B6C835F}"/>
-              </a:ext>
-            </a:extLst>
-          </p:cNvPr>
+          <p:cNvPr id="2" name="Title 1"/>
           <p:cNvSpPr>
             <a:spLocks noGrp="1"/>
           </p:cNvSpPr>
@@ -1254,18 +1107,13 @@
               <a:rPr lang="en-US"/>
               <a:t>Click to edit Master title style</a:t>
             </a:r>
+            <a:endParaRPr lang="en-US" dirty="0"/>
           </a:p>
         </p:txBody>
       </p:sp>
       <p:sp>
         <p:nvSpPr>
-          <p:cNvPr id="3" name="Content Placeholder 2">
-            <a:extLst>
-              <a:ext uri="{FF2B5EF4-FFF2-40B4-BE49-F238E27FC236}">
-                <a16:creationId xmlns:a16="http://schemas.microsoft.com/office/drawing/2014/main" id="{2D3C8BBB-6BB9-AC3B-FB79-8C4551EF290B}"/>
-              </a:ext>
-            </a:extLst>
-          </p:cNvPr>
+          <p:cNvPr id="3" name="Content Placeholder 2"/>
           <p:cNvSpPr>
             <a:spLocks noGrp="1"/>
           </p:cNvSpPr>
@@ -1275,8 +1123,8 @@
         </p:nvSpPr>
         <p:spPr>
           <a:xfrm>
-            <a:off x="838200" y="1825625"/>
-            <a:ext cx="5181600" cy="4351338"/>
+            <a:off x="974408" y="1825625"/>
+            <a:ext cx="6023610" cy="4351338"/>
           </a:xfrm>
         </p:spPr>
         <p:txBody>
@@ -1286,7 +1134,7 @@
             <a:pPr lvl="0"/>
             <a:r>
               <a:rPr lang="en-US"/>
-              <a:t>Click to edit Master text styles</a:t>
+              <a:t>Edit Master text styles</a:t>
             </a:r>
           </a:p>
           <a:p>
@@ -1316,18 +1164,13 @@
               <a:rPr lang="en-US"/>
               <a:t>Fifth level</a:t>
             </a:r>
+            <a:endParaRPr lang="en-US" dirty="0"/>
           </a:p>
         </p:txBody>
       </p:sp>
       <p:sp>
         <p:nvSpPr>
-          <p:cNvPr id="4" name="Content Placeholder 3">
-            <a:extLst>
-              <a:ext uri="{FF2B5EF4-FFF2-40B4-BE49-F238E27FC236}">
-                <a16:creationId xmlns:a16="http://schemas.microsoft.com/office/drawing/2014/main" id="{CF1F8C87-83E7-0A36-3736-5B4215C67DBE}"/>
-              </a:ext>
-            </a:extLst>
-          </p:cNvPr>
+          <p:cNvPr id="4" name="Content Placeholder 3"/>
           <p:cNvSpPr>
             <a:spLocks noGrp="1"/>
           </p:cNvSpPr>
@@ -1337,8 +1180,8 @@
         </p:nvSpPr>
         <p:spPr>
           <a:xfrm>
-            <a:off x="6172200" y="1825625"/>
-            <a:ext cx="5181600" cy="4351338"/>
+            <a:off x="7175183" y="1825625"/>
+            <a:ext cx="6023610" cy="4351338"/>
           </a:xfrm>
         </p:spPr>
         <p:txBody>
@@ -1348,7 +1191,7 @@
             <a:pPr lvl="0"/>
             <a:r>
               <a:rPr lang="en-US"/>
-              <a:t>Click to edit Master text styles</a:t>
+              <a:t>Edit Master text styles</a:t>
             </a:r>
           </a:p>
           <a:p>
@@ -1378,18 +1221,13 @@
               <a:rPr lang="en-US"/>
               <a:t>Fifth level</a:t>
             </a:r>
+            <a:endParaRPr lang="en-US" dirty="0"/>
           </a:p>
         </p:txBody>
       </p:sp>
       <p:sp>
         <p:nvSpPr>
-          <p:cNvPr id="5" name="Date Placeholder 4">
-            <a:extLst>
-              <a:ext uri="{FF2B5EF4-FFF2-40B4-BE49-F238E27FC236}">
-                <a16:creationId xmlns:a16="http://schemas.microsoft.com/office/drawing/2014/main" id="{022B789A-DBE4-0E2E-D06B-CC9CD14B32DF}"/>
-              </a:ext>
-            </a:extLst>
-          </p:cNvPr>
+          <p:cNvPr id="5" name="Date Placeholder 4"/>
           <p:cNvSpPr>
             <a:spLocks noGrp="1"/>
           </p:cNvSpPr>
@@ -1404,7 +1242,7 @@
           <a:p>
             <a:fld id="{CB924714-913E-5C48-97C6-641C2CDBA41D}" type="datetimeFigureOut">
               <a:rPr lang="en-US" smtClean="0"/>
-              <a:t>6/12/2023</a:t>
+              <a:t>6/15/2023</a:t>
             </a:fld>
             <a:endParaRPr lang="en-US" dirty="0"/>
           </a:p>
@@ -1412,13 +1250,7 @@
       </p:sp>
       <p:sp>
         <p:nvSpPr>
-          <p:cNvPr id="6" name="Footer Placeholder 5">
-            <a:extLst>
-              <a:ext uri="{FF2B5EF4-FFF2-40B4-BE49-F238E27FC236}">
-                <a16:creationId xmlns:a16="http://schemas.microsoft.com/office/drawing/2014/main" id="{7F7DF0F9-A5BF-2CDD-9060-63F686DD63A3}"/>
-              </a:ext>
-            </a:extLst>
-          </p:cNvPr>
+          <p:cNvPr id="6" name="Footer Placeholder 5"/>
           <p:cNvSpPr>
             <a:spLocks noGrp="1"/>
           </p:cNvSpPr>
@@ -1437,13 +1269,7 @@
       </p:sp>
       <p:sp>
         <p:nvSpPr>
-          <p:cNvPr id="7" name="Slide Number Placeholder 6">
-            <a:extLst>
-              <a:ext uri="{FF2B5EF4-FFF2-40B4-BE49-F238E27FC236}">
-                <a16:creationId xmlns:a16="http://schemas.microsoft.com/office/drawing/2014/main" id="{73FEFE1E-5780-B1AB-DEEA-C8C728A68F5B}"/>
-              </a:ext>
-            </a:extLst>
-          </p:cNvPr>
+          <p:cNvPr id="7" name="Slide Number Placeholder 6"/>
           <p:cNvSpPr>
             <a:spLocks noGrp="1"/>
           </p:cNvSpPr>
@@ -1467,7 +1293,7 @@
     </p:spTree>
     <p:extLst>
       <p:ext uri="{BB962C8B-B14F-4D97-AF65-F5344CB8AC3E}">
-        <p14:creationId xmlns:p14="http://schemas.microsoft.com/office/powerpoint/2010/main" val="1251424152"/>
+        <p14:creationId xmlns:p14="http://schemas.microsoft.com/office/powerpoint/2010/main" val="4278716865"/>
       </p:ext>
     </p:extLst>
   </p:cSld>
@@ -1496,13 +1322,7 @@
       </p:grpSpPr>
       <p:sp>
         <p:nvSpPr>
-          <p:cNvPr id="2" name="Title 1">
-            <a:extLst>
-              <a:ext uri="{FF2B5EF4-FFF2-40B4-BE49-F238E27FC236}">
-                <a16:creationId xmlns:a16="http://schemas.microsoft.com/office/drawing/2014/main" id="{E8814BBE-9145-445B-B1B9-F415B264E866}"/>
-              </a:ext>
-            </a:extLst>
-          </p:cNvPr>
+          <p:cNvPr id="2" name="Title 1"/>
           <p:cNvSpPr>
             <a:spLocks noGrp="1"/>
           </p:cNvSpPr>
@@ -1512,8 +1332,8 @@
         </p:nvSpPr>
         <p:spPr>
           <a:xfrm>
-            <a:off x="839788" y="365125"/>
-            <a:ext cx="10515600" cy="1325563"/>
+            <a:off x="976254" y="365126"/>
+            <a:ext cx="12224385" cy="1325563"/>
           </a:xfrm>
         </p:spPr>
         <p:txBody>
@@ -1524,18 +1344,13 @@
               <a:rPr lang="en-US"/>
               <a:t>Click to edit Master title style</a:t>
             </a:r>
+            <a:endParaRPr lang="en-US" dirty="0"/>
           </a:p>
         </p:txBody>
       </p:sp>
       <p:sp>
         <p:nvSpPr>
-          <p:cNvPr id="3" name="Text Placeholder 2">
-            <a:extLst>
-              <a:ext uri="{FF2B5EF4-FFF2-40B4-BE49-F238E27FC236}">
-                <a16:creationId xmlns:a16="http://schemas.microsoft.com/office/drawing/2014/main" id="{A36669CC-A589-116E-EA4F-1B7F5D61C906}"/>
-              </a:ext>
-            </a:extLst>
-          </p:cNvPr>
+          <p:cNvPr id="3" name="Text Placeholder 2"/>
           <p:cNvSpPr>
             <a:spLocks noGrp="1"/>
           </p:cNvSpPr>
@@ -1545,8 +1360,8 @@
         </p:nvSpPr>
         <p:spPr>
           <a:xfrm>
-            <a:off x="839788" y="1681163"/>
-            <a:ext cx="5157787" cy="823912"/>
+            <a:off x="976254" y="1681163"/>
+            <a:ext cx="5995927" cy="823912"/>
           </a:xfrm>
         </p:spPr>
         <p:txBody>
@@ -1593,20 +1408,14 @@
             <a:pPr lvl="0"/>
             <a:r>
               <a:rPr lang="en-US"/>
-              <a:t>Click to edit Master text styles</a:t>
+              <a:t>Edit Master text styles</a:t>
             </a:r>
           </a:p>
         </p:txBody>
       </p:sp>
       <p:sp>
         <p:nvSpPr>
-          <p:cNvPr id="4" name="Content Placeholder 3">
-            <a:extLst>
-              <a:ext uri="{FF2B5EF4-FFF2-40B4-BE49-F238E27FC236}">
-                <a16:creationId xmlns:a16="http://schemas.microsoft.com/office/drawing/2014/main" id="{8BB32D4C-23F6-1E11-DAE2-43C31A5A2A34}"/>
-              </a:ext>
-            </a:extLst>
-          </p:cNvPr>
+          <p:cNvPr id="4" name="Content Placeholder 3"/>
           <p:cNvSpPr>
             <a:spLocks noGrp="1"/>
           </p:cNvSpPr>
@@ -1616,8 +1425,8 @@
         </p:nvSpPr>
         <p:spPr>
           <a:xfrm>
-            <a:off x="839788" y="2505075"/>
-            <a:ext cx="5157787" cy="3684588"/>
+            <a:off x="976254" y="2505075"/>
+            <a:ext cx="5995927" cy="3684588"/>
           </a:xfrm>
         </p:spPr>
         <p:txBody>
@@ -1627,7 +1436,7 @@
             <a:pPr lvl="0"/>
             <a:r>
               <a:rPr lang="en-US"/>
-              <a:t>Click to edit Master text styles</a:t>
+              <a:t>Edit Master text styles</a:t>
             </a:r>
           </a:p>
           <a:p>
@@ -1657,18 +1466,13 @@
               <a:rPr lang="en-US"/>
               <a:t>Fifth level</a:t>
             </a:r>
+            <a:endParaRPr lang="en-US" dirty="0"/>
           </a:p>
         </p:txBody>
       </p:sp>
       <p:sp>
         <p:nvSpPr>
-          <p:cNvPr id="5" name="Text Placeholder 4">
-            <a:extLst>
-              <a:ext uri="{FF2B5EF4-FFF2-40B4-BE49-F238E27FC236}">
-                <a16:creationId xmlns:a16="http://schemas.microsoft.com/office/drawing/2014/main" id="{566D5552-2423-6BD3-103E-A69D92F5B139}"/>
-              </a:ext>
-            </a:extLst>
-          </p:cNvPr>
+          <p:cNvPr id="5" name="Text Placeholder 4"/>
           <p:cNvSpPr>
             <a:spLocks noGrp="1"/>
           </p:cNvSpPr>
@@ -1678,8 +1482,8 @@
         </p:nvSpPr>
         <p:spPr>
           <a:xfrm>
-            <a:off x="6172200" y="1681163"/>
-            <a:ext cx="5183188" cy="823912"/>
+            <a:off x="7175183" y="1681163"/>
+            <a:ext cx="6025456" cy="823912"/>
           </a:xfrm>
         </p:spPr>
         <p:txBody>
@@ -1726,20 +1530,14 @@
             <a:pPr lvl="0"/>
             <a:r>
               <a:rPr lang="en-US"/>
-              <a:t>Click to edit Master text styles</a:t>
+              <a:t>Edit Master text styles</a:t>
             </a:r>
           </a:p>
         </p:txBody>
       </p:sp>
       <p:sp>
         <p:nvSpPr>
-          <p:cNvPr id="6" name="Content Placeholder 5">
-            <a:extLst>
-              <a:ext uri="{FF2B5EF4-FFF2-40B4-BE49-F238E27FC236}">
-                <a16:creationId xmlns:a16="http://schemas.microsoft.com/office/drawing/2014/main" id="{A29938DC-D2CE-13DB-8583-7FDC68EAA05E}"/>
-              </a:ext>
-            </a:extLst>
-          </p:cNvPr>
+          <p:cNvPr id="6" name="Content Placeholder 5"/>
           <p:cNvSpPr>
             <a:spLocks noGrp="1"/>
           </p:cNvSpPr>
@@ -1749,8 +1547,8 @@
         </p:nvSpPr>
         <p:spPr>
           <a:xfrm>
-            <a:off x="6172200" y="2505075"/>
-            <a:ext cx="5183188" cy="3684588"/>
+            <a:off x="7175183" y="2505075"/>
+            <a:ext cx="6025456" cy="3684588"/>
           </a:xfrm>
         </p:spPr>
         <p:txBody>
@@ -1760,7 +1558,7 @@
             <a:pPr lvl="0"/>
             <a:r>
               <a:rPr lang="en-US"/>
-              <a:t>Click to edit Master text styles</a:t>
+              <a:t>Edit Master text styles</a:t>
             </a:r>
           </a:p>
           <a:p>
@@ -1790,18 +1588,13 @@
               <a:rPr lang="en-US"/>
               <a:t>Fifth level</a:t>
             </a:r>
+            <a:endParaRPr lang="en-US" dirty="0"/>
           </a:p>
         </p:txBody>
       </p:sp>
       <p:sp>
         <p:nvSpPr>
-          <p:cNvPr id="7" name="Date Placeholder 6">
-            <a:extLst>
-              <a:ext uri="{FF2B5EF4-FFF2-40B4-BE49-F238E27FC236}">
-                <a16:creationId xmlns:a16="http://schemas.microsoft.com/office/drawing/2014/main" id="{AA4411DC-64C1-E2C3-D08F-D80821EB2028}"/>
-              </a:ext>
-            </a:extLst>
-          </p:cNvPr>
+          <p:cNvPr id="7" name="Date Placeholder 6"/>
           <p:cNvSpPr>
             <a:spLocks noGrp="1"/>
           </p:cNvSpPr>
@@ -1816,7 +1609,7 @@
           <a:p>
             <a:fld id="{CB924714-913E-5C48-97C6-641C2CDBA41D}" type="datetimeFigureOut">
               <a:rPr lang="en-US" smtClean="0"/>
-              <a:t>6/12/2023</a:t>
+              <a:t>6/15/2023</a:t>
             </a:fld>
             <a:endParaRPr lang="en-US" dirty="0"/>
           </a:p>
@@ -1824,13 +1617,7 @@
       </p:sp>
       <p:sp>
         <p:nvSpPr>
-          <p:cNvPr id="8" name="Footer Placeholder 7">
-            <a:extLst>
-              <a:ext uri="{FF2B5EF4-FFF2-40B4-BE49-F238E27FC236}">
-                <a16:creationId xmlns:a16="http://schemas.microsoft.com/office/drawing/2014/main" id="{E4A68B59-7F5E-3722-2C07-B6E5E9C804DB}"/>
-              </a:ext>
-            </a:extLst>
-          </p:cNvPr>
+          <p:cNvPr id="8" name="Footer Placeholder 7"/>
           <p:cNvSpPr>
             <a:spLocks noGrp="1"/>
           </p:cNvSpPr>
@@ -1849,13 +1636,7 @@
       </p:sp>
       <p:sp>
         <p:nvSpPr>
-          <p:cNvPr id="9" name="Slide Number Placeholder 8">
-            <a:extLst>
-              <a:ext uri="{FF2B5EF4-FFF2-40B4-BE49-F238E27FC236}">
-                <a16:creationId xmlns:a16="http://schemas.microsoft.com/office/drawing/2014/main" id="{CB496C17-1161-12C1-2681-F95D2148D450}"/>
-              </a:ext>
-            </a:extLst>
-          </p:cNvPr>
+          <p:cNvPr id="9" name="Slide Number Placeholder 8"/>
           <p:cNvSpPr>
             <a:spLocks noGrp="1"/>
           </p:cNvSpPr>
@@ -1879,7 +1660,7 @@
     </p:spTree>
     <p:extLst>
       <p:ext uri="{BB962C8B-B14F-4D97-AF65-F5344CB8AC3E}">
-        <p14:creationId xmlns:p14="http://schemas.microsoft.com/office/powerpoint/2010/main" val="2987145550"/>
+        <p14:creationId xmlns:p14="http://schemas.microsoft.com/office/powerpoint/2010/main" val="1130314585"/>
       </p:ext>
     </p:extLst>
   </p:cSld>
@@ -1908,13 +1689,7 @@
       </p:grpSpPr>
       <p:sp>
         <p:nvSpPr>
-          <p:cNvPr id="2" name="Title 1">
-            <a:extLst>
-              <a:ext uri="{FF2B5EF4-FFF2-40B4-BE49-F238E27FC236}">
-                <a16:creationId xmlns:a16="http://schemas.microsoft.com/office/drawing/2014/main" id="{CFA37ACB-6400-4F0B-9DB7-F40EBD240B3C}"/>
-              </a:ext>
-            </a:extLst>
-          </p:cNvPr>
+          <p:cNvPr id="2" name="Title 1"/>
           <p:cNvSpPr>
             <a:spLocks noGrp="1"/>
           </p:cNvSpPr>
@@ -1931,18 +1706,13 @@
               <a:rPr lang="en-US"/>
               <a:t>Click to edit Master title style</a:t>
             </a:r>
+            <a:endParaRPr lang="en-US" dirty="0"/>
           </a:p>
         </p:txBody>
       </p:sp>
       <p:sp>
         <p:nvSpPr>
-          <p:cNvPr id="3" name="Date Placeholder 2">
-            <a:extLst>
-              <a:ext uri="{FF2B5EF4-FFF2-40B4-BE49-F238E27FC236}">
-                <a16:creationId xmlns:a16="http://schemas.microsoft.com/office/drawing/2014/main" id="{F3CF4A6E-1930-8928-0496-9A735A66FFE9}"/>
-              </a:ext>
-            </a:extLst>
-          </p:cNvPr>
+          <p:cNvPr id="3" name="Date Placeholder 2"/>
           <p:cNvSpPr>
             <a:spLocks noGrp="1"/>
           </p:cNvSpPr>
@@ -1957,7 +1727,7 @@
           <a:p>
             <a:fld id="{CB924714-913E-5C48-97C6-641C2CDBA41D}" type="datetimeFigureOut">
               <a:rPr lang="en-US" smtClean="0"/>
-              <a:t>6/12/2023</a:t>
+              <a:t>6/15/2023</a:t>
             </a:fld>
             <a:endParaRPr lang="en-US" dirty="0"/>
           </a:p>
@@ -1965,13 +1735,7 @@
       </p:sp>
       <p:sp>
         <p:nvSpPr>
-          <p:cNvPr id="4" name="Footer Placeholder 3">
-            <a:extLst>
-              <a:ext uri="{FF2B5EF4-FFF2-40B4-BE49-F238E27FC236}">
-                <a16:creationId xmlns:a16="http://schemas.microsoft.com/office/drawing/2014/main" id="{558F1D74-7093-B883-D76D-49A5E1D916E3}"/>
-              </a:ext>
-            </a:extLst>
-          </p:cNvPr>
+          <p:cNvPr id="4" name="Footer Placeholder 3"/>
           <p:cNvSpPr>
             <a:spLocks noGrp="1"/>
           </p:cNvSpPr>
@@ -1990,13 +1754,7 @@
       </p:sp>
       <p:sp>
         <p:nvSpPr>
-          <p:cNvPr id="5" name="Slide Number Placeholder 4">
-            <a:extLst>
-              <a:ext uri="{FF2B5EF4-FFF2-40B4-BE49-F238E27FC236}">
-                <a16:creationId xmlns:a16="http://schemas.microsoft.com/office/drawing/2014/main" id="{61F23ABB-FC50-F81F-4475-30BD356EE93D}"/>
-              </a:ext>
-            </a:extLst>
-          </p:cNvPr>
+          <p:cNvPr id="5" name="Slide Number Placeholder 4"/>
           <p:cNvSpPr>
             <a:spLocks noGrp="1"/>
           </p:cNvSpPr>
@@ -2020,7 +1778,7 @@
     </p:spTree>
     <p:extLst>
       <p:ext uri="{BB962C8B-B14F-4D97-AF65-F5344CB8AC3E}">
-        <p14:creationId xmlns:p14="http://schemas.microsoft.com/office/powerpoint/2010/main" val="3511006806"/>
+        <p14:creationId xmlns:p14="http://schemas.microsoft.com/office/powerpoint/2010/main" val="4045726806"/>
       </p:ext>
     </p:extLst>
   </p:cSld>
@@ -2049,13 +1807,7 @@
       </p:grpSpPr>
       <p:sp>
         <p:nvSpPr>
-          <p:cNvPr id="2" name="Date Placeholder 1">
-            <a:extLst>
-              <a:ext uri="{FF2B5EF4-FFF2-40B4-BE49-F238E27FC236}">
-                <a16:creationId xmlns:a16="http://schemas.microsoft.com/office/drawing/2014/main" id="{F4F40B01-822F-CC00-C8E4-724AF85E0E05}"/>
-              </a:ext>
-            </a:extLst>
-          </p:cNvPr>
+          <p:cNvPr id="2" name="Date Placeholder 1"/>
           <p:cNvSpPr>
             <a:spLocks noGrp="1"/>
           </p:cNvSpPr>
@@ -2070,7 +1822,7 @@
           <a:p>
             <a:fld id="{CB924714-913E-5C48-97C6-641C2CDBA41D}" type="datetimeFigureOut">
               <a:rPr lang="en-US" smtClean="0"/>
-              <a:t>6/12/2023</a:t>
+              <a:t>6/15/2023</a:t>
             </a:fld>
             <a:endParaRPr lang="en-US" dirty="0"/>
           </a:p>
@@ -2078,13 +1830,7 @@
       </p:sp>
       <p:sp>
         <p:nvSpPr>
-          <p:cNvPr id="3" name="Footer Placeholder 2">
-            <a:extLst>
-              <a:ext uri="{FF2B5EF4-FFF2-40B4-BE49-F238E27FC236}">
-                <a16:creationId xmlns:a16="http://schemas.microsoft.com/office/drawing/2014/main" id="{8D62F516-428D-36EF-5802-D10C1C5160D2}"/>
-              </a:ext>
-            </a:extLst>
-          </p:cNvPr>
+          <p:cNvPr id="3" name="Footer Placeholder 2"/>
           <p:cNvSpPr>
             <a:spLocks noGrp="1"/>
           </p:cNvSpPr>
@@ -2103,13 +1849,7 @@
       </p:sp>
       <p:sp>
         <p:nvSpPr>
-          <p:cNvPr id="4" name="Slide Number Placeholder 3">
-            <a:extLst>
-              <a:ext uri="{FF2B5EF4-FFF2-40B4-BE49-F238E27FC236}">
-                <a16:creationId xmlns:a16="http://schemas.microsoft.com/office/drawing/2014/main" id="{5800B196-78F4-D9AF-D39E-8A9D61428A52}"/>
-              </a:ext>
-            </a:extLst>
-          </p:cNvPr>
+          <p:cNvPr id="4" name="Slide Number Placeholder 3"/>
           <p:cNvSpPr>
             <a:spLocks noGrp="1"/>
           </p:cNvSpPr>
@@ -2133,7 +1873,7 @@
     </p:spTree>
     <p:extLst>
       <p:ext uri="{BB962C8B-B14F-4D97-AF65-F5344CB8AC3E}">
-        <p14:creationId xmlns:p14="http://schemas.microsoft.com/office/powerpoint/2010/main" val="3230888780"/>
+        <p14:creationId xmlns:p14="http://schemas.microsoft.com/office/powerpoint/2010/main" val="2041410045"/>
       </p:ext>
     </p:extLst>
   </p:cSld>
@@ -2162,13 +1902,7 @@
       </p:grpSpPr>
       <p:sp>
         <p:nvSpPr>
-          <p:cNvPr id="2" name="Title 1">
-            <a:extLst>
-              <a:ext uri="{FF2B5EF4-FFF2-40B4-BE49-F238E27FC236}">
-                <a16:creationId xmlns:a16="http://schemas.microsoft.com/office/drawing/2014/main" id="{F7DE4963-C310-6360-1EAC-6B778AEA0992}"/>
-              </a:ext>
-            </a:extLst>
-          </p:cNvPr>
+          <p:cNvPr id="2" name="Title 1"/>
           <p:cNvSpPr>
             <a:spLocks noGrp="1"/>
           </p:cNvSpPr>
@@ -2178,8 +1912,8 @@
         </p:nvSpPr>
         <p:spPr>
           <a:xfrm>
-            <a:off x="839788" y="457200"/>
-            <a:ext cx="3932237" cy="1600200"/>
+            <a:off x="976254" y="457200"/>
+            <a:ext cx="4571226" cy="1600200"/>
           </a:xfrm>
         </p:spPr>
         <p:txBody>
@@ -2194,18 +1928,13 @@
               <a:rPr lang="en-US"/>
               <a:t>Click to edit Master title style</a:t>
             </a:r>
+            <a:endParaRPr lang="en-US" dirty="0"/>
           </a:p>
         </p:txBody>
       </p:sp>
       <p:sp>
         <p:nvSpPr>
-          <p:cNvPr id="3" name="Content Placeholder 2">
-            <a:extLst>
-              <a:ext uri="{FF2B5EF4-FFF2-40B4-BE49-F238E27FC236}">
-                <a16:creationId xmlns:a16="http://schemas.microsoft.com/office/drawing/2014/main" id="{361A61DA-FE27-A458-138E-EAB4637922AC}"/>
-              </a:ext>
-            </a:extLst>
-          </p:cNvPr>
+          <p:cNvPr id="3" name="Content Placeholder 2"/>
           <p:cNvSpPr>
             <a:spLocks noGrp="1"/>
           </p:cNvSpPr>
@@ -2215,8 +1944,8 @@
         </p:nvSpPr>
         <p:spPr>
           <a:xfrm>
-            <a:off x="5183188" y="987425"/>
-            <a:ext cx="6172200" cy="4873625"/>
+            <a:off x="6025456" y="987426"/>
+            <a:ext cx="7175183" cy="4873625"/>
           </a:xfrm>
         </p:spPr>
         <p:txBody>
@@ -2254,7 +1983,7 @@
             <a:pPr lvl="0"/>
             <a:r>
               <a:rPr lang="en-US"/>
-              <a:t>Click to edit Master text styles</a:t>
+              <a:t>Edit Master text styles</a:t>
             </a:r>
           </a:p>
           <a:p>
@@ -2284,18 +2013,13 @@
               <a:rPr lang="en-US"/>
               <a:t>Fifth level</a:t>
             </a:r>
+            <a:endParaRPr lang="en-US" dirty="0"/>
           </a:p>
         </p:txBody>
       </p:sp>
       <p:sp>
         <p:nvSpPr>
-          <p:cNvPr id="4" name="Text Placeholder 3">
-            <a:extLst>
-              <a:ext uri="{FF2B5EF4-FFF2-40B4-BE49-F238E27FC236}">
-                <a16:creationId xmlns:a16="http://schemas.microsoft.com/office/drawing/2014/main" id="{77544EBD-61C1-0DAE-8BF8-2C201D85FD3D}"/>
-              </a:ext>
-            </a:extLst>
-          </p:cNvPr>
+          <p:cNvPr id="4" name="Text Placeholder 3"/>
           <p:cNvSpPr>
             <a:spLocks noGrp="1"/>
           </p:cNvSpPr>
@@ -2305,8 +2029,8 @@
         </p:nvSpPr>
         <p:spPr>
           <a:xfrm>
-            <a:off x="839788" y="2057400"/>
-            <a:ext cx="3932237" cy="3811588"/>
+            <a:off x="976254" y="2057400"/>
+            <a:ext cx="4571226" cy="3811588"/>
           </a:xfrm>
         </p:spPr>
         <p:txBody>
@@ -2353,20 +2077,14 @@
             <a:pPr lvl="0"/>
             <a:r>
               <a:rPr lang="en-US"/>
-              <a:t>Click to edit Master text styles</a:t>
+              <a:t>Edit Master text styles</a:t>
             </a:r>
           </a:p>
         </p:txBody>
       </p:sp>
       <p:sp>
         <p:nvSpPr>
-          <p:cNvPr id="5" name="Date Placeholder 4">
-            <a:extLst>
-              <a:ext uri="{FF2B5EF4-FFF2-40B4-BE49-F238E27FC236}">
-                <a16:creationId xmlns:a16="http://schemas.microsoft.com/office/drawing/2014/main" id="{864C9AE4-348D-6590-2E86-91B82556DD2E}"/>
-              </a:ext>
-            </a:extLst>
-          </p:cNvPr>
+          <p:cNvPr id="5" name="Date Placeholder 4"/>
           <p:cNvSpPr>
             <a:spLocks noGrp="1"/>
           </p:cNvSpPr>
@@ -2381,7 +2099,7 @@
           <a:p>
             <a:fld id="{CB924714-913E-5C48-97C6-641C2CDBA41D}" type="datetimeFigureOut">
               <a:rPr lang="en-US" smtClean="0"/>
-              <a:t>6/12/2023</a:t>
+              <a:t>6/15/2023</a:t>
             </a:fld>
             <a:endParaRPr lang="en-US" dirty="0"/>
           </a:p>
@@ -2389,13 +2107,7 @@
       </p:sp>
       <p:sp>
         <p:nvSpPr>
-          <p:cNvPr id="6" name="Footer Placeholder 5">
-            <a:extLst>
-              <a:ext uri="{FF2B5EF4-FFF2-40B4-BE49-F238E27FC236}">
-                <a16:creationId xmlns:a16="http://schemas.microsoft.com/office/drawing/2014/main" id="{0AC8B6E1-45B3-7708-67DB-F9A74DB4AC6A}"/>
-              </a:ext>
-            </a:extLst>
-          </p:cNvPr>
+          <p:cNvPr id="6" name="Footer Placeholder 5"/>
           <p:cNvSpPr>
             <a:spLocks noGrp="1"/>
           </p:cNvSpPr>
@@ -2414,13 +2126,7 @@
       </p:sp>
       <p:sp>
         <p:nvSpPr>
-          <p:cNvPr id="7" name="Slide Number Placeholder 6">
-            <a:extLst>
-              <a:ext uri="{FF2B5EF4-FFF2-40B4-BE49-F238E27FC236}">
-                <a16:creationId xmlns:a16="http://schemas.microsoft.com/office/drawing/2014/main" id="{19B29A43-3BB0-828F-51DF-676C3BF8FEA9}"/>
-              </a:ext>
-            </a:extLst>
-          </p:cNvPr>
+          <p:cNvPr id="7" name="Slide Number Placeholder 6"/>
           <p:cNvSpPr>
             <a:spLocks noGrp="1"/>
           </p:cNvSpPr>
@@ -2444,7 +2150,7 @@
     </p:spTree>
     <p:extLst>
       <p:ext uri="{BB962C8B-B14F-4D97-AF65-F5344CB8AC3E}">
-        <p14:creationId xmlns:p14="http://schemas.microsoft.com/office/powerpoint/2010/main" val="2281009312"/>
+        <p14:creationId xmlns:p14="http://schemas.microsoft.com/office/powerpoint/2010/main" val="3391277987"/>
       </p:ext>
     </p:extLst>
   </p:cSld>
@@ -2473,13 +2179,7 @@
       </p:grpSpPr>
       <p:sp>
         <p:nvSpPr>
-          <p:cNvPr id="2" name="Title 1">
-            <a:extLst>
-              <a:ext uri="{FF2B5EF4-FFF2-40B4-BE49-F238E27FC236}">
-                <a16:creationId xmlns:a16="http://schemas.microsoft.com/office/drawing/2014/main" id="{3CD5DE0D-9E57-5DFA-7BAC-C50077D3858F}"/>
-              </a:ext>
-            </a:extLst>
-          </p:cNvPr>
+          <p:cNvPr id="2" name="Title 1"/>
           <p:cNvSpPr>
             <a:spLocks noGrp="1"/>
           </p:cNvSpPr>
@@ -2489,8 +2189,8 @@
         </p:nvSpPr>
         <p:spPr>
           <a:xfrm>
-            <a:off x="839788" y="457200"/>
-            <a:ext cx="3932237" cy="1600200"/>
+            <a:off x="976254" y="457200"/>
+            <a:ext cx="4571226" cy="1600200"/>
           </a:xfrm>
         </p:spPr>
         <p:txBody>
@@ -2505,20 +2205,15 @@
               <a:rPr lang="en-US"/>
               <a:t>Click to edit Master title style</a:t>
             </a:r>
+            <a:endParaRPr lang="en-US" dirty="0"/>
           </a:p>
         </p:txBody>
       </p:sp>
       <p:sp>
         <p:nvSpPr>
-          <p:cNvPr id="3" name="Picture Placeholder 2">
-            <a:extLst>
-              <a:ext uri="{FF2B5EF4-FFF2-40B4-BE49-F238E27FC236}">
-                <a16:creationId xmlns:a16="http://schemas.microsoft.com/office/drawing/2014/main" id="{AC22AD84-B951-35B4-154C-CDC2DD184DAC}"/>
-              </a:ext>
-            </a:extLst>
-          </p:cNvPr>
+          <p:cNvPr id="3" name="Picture Placeholder 2"/>
           <p:cNvSpPr>
-            <a:spLocks noGrp="1"/>
+            <a:spLocks noGrp="1" noChangeAspect="1"/>
           </p:cNvSpPr>
           <p:nvPr>
             <p:ph type="pic" idx="1"/>
@@ -2526,12 +2221,12 @@
         </p:nvSpPr>
         <p:spPr>
           <a:xfrm>
-            <a:off x="5183188" y="987425"/>
-            <a:ext cx="6172200" cy="4873625"/>
+            <a:off x="6025456" y="987426"/>
+            <a:ext cx="7175183" cy="4873625"/>
           </a:xfrm>
         </p:spPr>
         <p:txBody>
-          <a:bodyPr/>
+          <a:bodyPr anchor="t"/>
           <a:lstStyle>
             <a:lvl1pPr marL="0" indent="0">
               <a:buNone/>
@@ -2571,19 +2266,17 @@
             </a:lvl9pPr>
           </a:lstStyle>
           <a:p>
+            <a:r>
+              <a:rPr lang="en-US"/>
+              <a:t>Click icon to add picture</a:t>
+            </a:r>
             <a:endParaRPr lang="en-US" dirty="0"/>
           </a:p>
         </p:txBody>
       </p:sp>
       <p:sp>
         <p:nvSpPr>
-          <p:cNvPr id="4" name="Text Placeholder 3">
-            <a:extLst>
-              <a:ext uri="{FF2B5EF4-FFF2-40B4-BE49-F238E27FC236}">
-                <a16:creationId xmlns:a16="http://schemas.microsoft.com/office/drawing/2014/main" id="{32391876-E228-8282-E77F-4E9991D9E3E0}"/>
-              </a:ext>
-            </a:extLst>
-          </p:cNvPr>
+          <p:cNvPr id="4" name="Text Placeholder 3"/>
           <p:cNvSpPr>
             <a:spLocks noGrp="1"/>
           </p:cNvSpPr>
@@ -2593,8 +2286,8 @@
         </p:nvSpPr>
         <p:spPr>
           <a:xfrm>
-            <a:off x="839788" y="2057400"/>
-            <a:ext cx="3932237" cy="3811588"/>
+            <a:off x="976254" y="2057400"/>
+            <a:ext cx="4571226" cy="3811588"/>
           </a:xfrm>
         </p:spPr>
         <p:txBody>
@@ -2641,20 +2334,14 @@
             <a:pPr lvl="0"/>
             <a:r>
               <a:rPr lang="en-US"/>
-              <a:t>Click to edit Master text styles</a:t>
+              <a:t>Edit Master text styles</a:t>
             </a:r>
           </a:p>
         </p:txBody>
       </p:sp>
       <p:sp>
         <p:nvSpPr>
-          <p:cNvPr id="5" name="Date Placeholder 4">
-            <a:extLst>
-              <a:ext uri="{FF2B5EF4-FFF2-40B4-BE49-F238E27FC236}">
-                <a16:creationId xmlns:a16="http://schemas.microsoft.com/office/drawing/2014/main" id="{49241A46-C859-D6C1-4F6E-49F2291920FB}"/>
-              </a:ext>
-            </a:extLst>
-          </p:cNvPr>
+          <p:cNvPr id="5" name="Date Placeholder 4"/>
           <p:cNvSpPr>
             <a:spLocks noGrp="1"/>
           </p:cNvSpPr>
@@ -2669,7 +2356,7 @@
           <a:p>
             <a:fld id="{CB924714-913E-5C48-97C6-641C2CDBA41D}" type="datetimeFigureOut">
               <a:rPr lang="en-US" smtClean="0"/>
-              <a:t>6/12/2023</a:t>
+              <a:t>6/15/2023</a:t>
             </a:fld>
             <a:endParaRPr lang="en-US" dirty="0"/>
           </a:p>
@@ -2677,13 +2364,7 @@
       </p:sp>
       <p:sp>
         <p:nvSpPr>
-          <p:cNvPr id="6" name="Footer Placeholder 5">
-            <a:extLst>
-              <a:ext uri="{FF2B5EF4-FFF2-40B4-BE49-F238E27FC236}">
-                <a16:creationId xmlns:a16="http://schemas.microsoft.com/office/drawing/2014/main" id="{AC51B19E-8DFC-6AA8-FFE5-E4A4F43C5FE0}"/>
-              </a:ext>
-            </a:extLst>
-          </p:cNvPr>
+          <p:cNvPr id="6" name="Footer Placeholder 5"/>
           <p:cNvSpPr>
             <a:spLocks noGrp="1"/>
           </p:cNvSpPr>
@@ -2702,13 +2383,7 @@
       </p:sp>
       <p:sp>
         <p:nvSpPr>
-          <p:cNvPr id="7" name="Slide Number Placeholder 6">
-            <a:extLst>
-              <a:ext uri="{FF2B5EF4-FFF2-40B4-BE49-F238E27FC236}">
-                <a16:creationId xmlns:a16="http://schemas.microsoft.com/office/drawing/2014/main" id="{0A8FE2D4-160B-ECDD-9BA6-355FB1B3AD04}"/>
-              </a:ext>
-            </a:extLst>
-          </p:cNvPr>
+          <p:cNvPr id="7" name="Slide Number Placeholder 6"/>
           <p:cNvSpPr>
             <a:spLocks noGrp="1"/>
           </p:cNvSpPr>
@@ -2732,7 +2407,7 @@
     </p:spTree>
     <p:extLst>
       <p:ext uri="{BB962C8B-B14F-4D97-AF65-F5344CB8AC3E}">
-        <p14:creationId xmlns:p14="http://schemas.microsoft.com/office/powerpoint/2010/main" val="2854413619"/>
+        <p14:creationId xmlns:p14="http://schemas.microsoft.com/office/powerpoint/2010/main" val="1825453133"/>
       </p:ext>
     </p:extLst>
   </p:cSld>
@@ -2766,13 +2441,7 @@
       </p:grpSpPr>
       <p:sp>
         <p:nvSpPr>
-          <p:cNvPr id="2" name="Title Placeholder 1">
-            <a:extLst>
-              <a:ext uri="{FF2B5EF4-FFF2-40B4-BE49-F238E27FC236}">
-                <a16:creationId xmlns:a16="http://schemas.microsoft.com/office/drawing/2014/main" id="{0530C0E5-C38D-13FC-4425-DD1B1C9C0431}"/>
-              </a:ext>
-            </a:extLst>
-          </p:cNvPr>
+          <p:cNvPr id="2" name="Title Placeholder 1"/>
           <p:cNvSpPr>
             <a:spLocks noGrp="1"/>
           </p:cNvSpPr>
@@ -2782,8 +2451,8 @@
         </p:nvSpPr>
         <p:spPr>
           <a:xfrm>
-            <a:off x="838200" y="365125"/>
-            <a:ext cx="10515600" cy="1325563"/>
+            <a:off x="974408" y="365126"/>
+            <a:ext cx="12224385" cy="1325563"/>
           </a:xfrm>
           <a:prstGeom prst="rect">
             <a:avLst/>
@@ -2799,18 +2468,13 @@
               <a:rPr lang="en-US"/>
               <a:t>Click to edit Master title style</a:t>
             </a:r>
+            <a:endParaRPr lang="en-US" dirty="0"/>
           </a:p>
         </p:txBody>
       </p:sp>
       <p:sp>
         <p:nvSpPr>
-          <p:cNvPr id="3" name="Text Placeholder 2">
-            <a:extLst>
-              <a:ext uri="{FF2B5EF4-FFF2-40B4-BE49-F238E27FC236}">
-                <a16:creationId xmlns:a16="http://schemas.microsoft.com/office/drawing/2014/main" id="{48DFABD9-F8AD-D767-1BF5-2C74DAD0C0C5}"/>
-              </a:ext>
-            </a:extLst>
-          </p:cNvPr>
+          <p:cNvPr id="3" name="Text Placeholder 2"/>
           <p:cNvSpPr>
             <a:spLocks noGrp="1"/>
           </p:cNvSpPr>
@@ -2820,8 +2484,8 @@
         </p:nvSpPr>
         <p:spPr>
           <a:xfrm>
-            <a:off x="838200" y="1825625"/>
-            <a:ext cx="10515600" cy="4351338"/>
+            <a:off x="974408" y="1825625"/>
+            <a:ext cx="12224385" cy="4351338"/>
           </a:xfrm>
           <a:prstGeom prst="rect">
             <a:avLst/>
@@ -2836,7 +2500,7 @@
             <a:pPr lvl="0"/>
             <a:r>
               <a:rPr lang="en-US"/>
-              <a:t>Click to edit Master text styles</a:t>
+              <a:t>Edit Master text styles</a:t>
             </a:r>
           </a:p>
           <a:p>
@@ -2866,18 +2530,13 @@
               <a:rPr lang="en-US"/>
               <a:t>Fifth level</a:t>
             </a:r>
+            <a:endParaRPr lang="en-US" dirty="0"/>
           </a:p>
         </p:txBody>
       </p:sp>
       <p:sp>
         <p:nvSpPr>
-          <p:cNvPr id="4" name="Date Placeholder 3">
-            <a:extLst>
-              <a:ext uri="{FF2B5EF4-FFF2-40B4-BE49-F238E27FC236}">
-                <a16:creationId xmlns:a16="http://schemas.microsoft.com/office/drawing/2014/main" id="{51653206-2217-748E-8B72-40A7DDA2156A}"/>
-              </a:ext>
-            </a:extLst>
-          </p:cNvPr>
+          <p:cNvPr id="4" name="Date Placeholder 3"/>
           <p:cNvSpPr>
             <a:spLocks noGrp="1"/>
           </p:cNvSpPr>
@@ -2887,8 +2546,8 @@
         </p:nvSpPr>
         <p:spPr>
           <a:xfrm>
-            <a:off x="838200" y="6356350"/>
-            <a:ext cx="2743200" cy="365125"/>
+            <a:off x="974408" y="6356351"/>
+            <a:ext cx="3188970" cy="365125"/>
           </a:xfrm>
           <a:prstGeom prst="rect">
             <a:avLst/>
@@ -2910,7 +2569,7 @@
           <a:p>
             <a:fld id="{CB924714-913E-5C48-97C6-641C2CDBA41D}" type="datetimeFigureOut">
               <a:rPr lang="en-US" smtClean="0"/>
-              <a:t>6/12/2023</a:t>
+              <a:t>6/15/2023</a:t>
             </a:fld>
             <a:endParaRPr lang="en-US" dirty="0"/>
           </a:p>
@@ -2918,13 +2577,7 @@
       </p:sp>
       <p:sp>
         <p:nvSpPr>
-          <p:cNvPr id="5" name="Footer Placeholder 4">
-            <a:extLst>
-              <a:ext uri="{FF2B5EF4-FFF2-40B4-BE49-F238E27FC236}">
-                <a16:creationId xmlns:a16="http://schemas.microsoft.com/office/drawing/2014/main" id="{D286B511-B3DC-22F6-2FF8-0ACC5432666B}"/>
-              </a:ext>
-            </a:extLst>
-          </p:cNvPr>
+          <p:cNvPr id="5" name="Footer Placeholder 4"/>
           <p:cNvSpPr>
             <a:spLocks noGrp="1"/>
           </p:cNvSpPr>
@@ -2934,8 +2587,8 @@
         </p:nvSpPr>
         <p:spPr>
           <a:xfrm>
-            <a:off x="4038600" y="6356350"/>
-            <a:ext cx="4114800" cy="365125"/>
+            <a:off x="4694873" y="6356351"/>
+            <a:ext cx="4783455" cy="365125"/>
           </a:xfrm>
           <a:prstGeom prst="rect">
             <a:avLst/>
@@ -2961,13 +2614,7 @@
       </p:sp>
       <p:sp>
         <p:nvSpPr>
-          <p:cNvPr id="6" name="Slide Number Placeholder 5">
-            <a:extLst>
-              <a:ext uri="{FF2B5EF4-FFF2-40B4-BE49-F238E27FC236}">
-                <a16:creationId xmlns:a16="http://schemas.microsoft.com/office/drawing/2014/main" id="{485DC1EC-E729-7375-55C8-CAB88E8E4B39}"/>
-              </a:ext>
-            </a:extLst>
-          </p:cNvPr>
+          <p:cNvPr id="6" name="Slide Number Placeholder 5"/>
           <p:cNvSpPr>
             <a:spLocks noGrp="1"/>
           </p:cNvSpPr>
@@ -2977,8 +2624,8 @@
         </p:nvSpPr>
         <p:spPr>
           <a:xfrm>
-            <a:off x="8610600" y="6356350"/>
-            <a:ext cx="2743200" cy="365125"/>
+            <a:off x="10009823" y="6356351"/>
+            <a:ext cx="3188970" cy="365125"/>
           </a:xfrm>
           <a:prstGeom prst="rect">
             <a:avLst/>
@@ -3009,23 +2656,23 @@
     </p:spTree>
     <p:extLst>
       <p:ext uri="{BB962C8B-B14F-4D97-AF65-F5344CB8AC3E}">
-        <p14:creationId xmlns:p14="http://schemas.microsoft.com/office/powerpoint/2010/main" val="2729562980"/>
+        <p14:creationId xmlns:p14="http://schemas.microsoft.com/office/powerpoint/2010/main" val="2151096923"/>
       </p:ext>
     </p:extLst>
   </p:cSld>
   <p:clrMap bg1="lt1" tx1="dk1" bg2="lt2" tx2="dk2" accent1="accent1" accent2="accent2" accent3="accent3" accent4="accent4" accent5="accent5" accent6="accent6" hlink="hlink" folHlink="folHlink"/>
   <p:sldLayoutIdLst>
-    <p:sldLayoutId id="2147483649" r:id="rId1"/>
-    <p:sldLayoutId id="2147483650" r:id="rId2"/>
-    <p:sldLayoutId id="2147483651" r:id="rId3"/>
-    <p:sldLayoutId id="2147483652" r:id="rId4"/>
-    <p:sldLayoutId id="2147483653" r:id="rId5"/>
-    <p:sldLayoutId id="2147483654" r:id="rId6"/>
-    <p:sldLayoutId id="2147483655" r:id="rId7"/>
-    <p:sldLayoutId id="2147483656" r:id="rId8"/>
-    <p:sldLayoutId id="2147483657" r:id="rId9"/>
-    <p:sldLayoutId id="2147483658" r:id="rId10"/>
-    <p:sldLayoutId id="2147483659" r:id="rId11"/>
+    <p:sldLayoutId id="2147483661" r:id="rId1"/>
+    <p:sldLayoutId id="2147483662" r:id="rId2"/>
+    <p:sldLayoutId id="2147483663" r:id="rId3"/>
+    <p:sldLayoutId id="2147483664" r:id="rId4"/>
+    <p:sldLayoutId id="2147483665" r:id="rId5"/>
+    <p:sldLayoutId id="2147483666" r:id="rId6"/>
+    <p:sldLayoutId id="2147483667" r:id="rId7"/>
+    <p:sldLayoutId id="2147483668" r:id="rId8"/>
+    <p:sldLayoutId id="2147483669" r:id="rId9"/>
+    <p:sldLayoutId id="2147483670" r:id="rId10"/>
+    <p:sldLayoutId id="2147483671" r:id="rId11"/>
   </p:sldLayoutIdLst>
   <p:txStyles>
     <p:titleStyle>
@@ -3343,7 +2990,7 @@
         </p:nvCxnSpPr>
         <p:spPr bwMode="auto">
           <a:xfrm>
-            <a:off x="1448081" y="2129031"/>
+            <a:off x="2438681" y="2129031"/>
             <a:ext cx="0" cy="1805372"/>
           </a:xfrm>
           <a:prstGeom prst="straightConnector1">
@@ -3386,7 +3033,7 @@
         </p:nvSpPr>
         <p:spPr>
           <a:xfrm>
-            <a:off x="1270467" y="2410326"/>
+            <a:off x="2261068" y="2410326"/>
             <a:ext cx="355227" cy="654886"/>
           </a:xfrm>
           <a:prstGeom prst="rect">
@@ -3442,7 +3089,7 @@
         </p:nvCxnSpPr>
         <p:spPr bwMode="auto">
           <a:xfrm flipH="1">
-            <a:off x="1448081" y="2131467"/>
+            <a:off x="2438683" y="2131467"/>
             <a:ext cx="9241079" cy="0"/>
           </a:xfrm>
           <a:prstGeom prst="straightConnector1">
@@ -3485,7 +3132,7 @@
         </p:nvSpPr>
         <p:spPr>
           <a:xfrm>
-            <a:off x="8125310" y="1990529"/>
+            <a:off x="9115912" y="1990530"/>
             <a:ext cx="355227" cy="277005"/>
           </a:xfrm>
           <a:prstGeom prst="rect">
@@ -3539,7 +3186,7 @@
         </p:nvSpPr>
         <p:spPr>
           <a:xfrm>
-            <a:off x="3961492" y="2009215"/>
+            <a:off x="4952093" y="2009217"/>
             <a:ext cx="355227" cy="277005"/>
           </a:xfrm>
           <a:prstGeom prst="rect">
@@ -3595,7 +3242,7 @@
         </p:nvCxnSpPr>
         <p:spPr bwMode="auto">
           <a:xfrm>
-            <a:off x="8302925" y="1461053"/>
+            <a:off x="9293525" y="1461055"/>
             <a:ext cx="0" cy="1618753"/>
           </a:xfrm>
           <a:prstGeom prst="straightConnector1">
@@ -3638,7 +3285,7 @@
         </p:nvSpPr>
         <p:spPr>
           <a:xfrm>
-            <a:off x="7871134" y="2441182"/>
+            <a:off x="8861736" y="2441182"/>
             <a:ext cx="355227" cy="509472"/>
           </a:xfrm>
           <a:prstGeom prst="rect">
@@ -3694,7 +3341,7 @@
         </p:nvCxnSpPr>
         <p:spPr bwMode="auto">
           <a:xfrm flipV="1">
-            <a:off x="3287498" y="3076941"/>
+            <a:off x="4278098" y="3076943"/>
             <a:ext cx="0" cy="803557"/>
           </a:xfrm>
           <a:prstGeom prst="straightConnector1">
@@ -3737,7 +3384,7 @@
         </p:nvSpPr>
         <p:spPr>
           <a:xfrm>
-            <a:off x="3115180" y="3340216"/>
+            <a:off x="4105782" y="3340218"/>
             <a:ext cx="355227" cy="277005"/>
           </a:xfrm>
           <a:prstGeom prst="rect">
@@ -3793,7 +3440,7 @@
         </p:nvCxnSpPr>
         <p:spPr bwMode="auto">
           <a:xfrm>
-            <a:off x="6456406" y="3074016"/>
+            <a:off x="7447006" y="3074016"/>
             <a:ext cx="0" cy="806482"/>
           </a:xfrm>
           <a:prstGeom prst="straightConnector1">
@@ -3836,7 +3483,7 @@
         </p:nvSpPr>
         <p:spPr>
           <a:xfrm>
-            <a:off x="6313357" y="3372914"/>
+            <a:off x="7303958" y="3372915"/>
             <a:ext cx="355227" cy="277005"/>
           </a:xfrm>
           <a:prstGeom prst="rect">
@@ -3892,7 +3539,7 @@
         </p:nvCxnSpPr>
         <p:spPr bwMode="auto">
           <a:xfrm>
-            <a:off x="9114387" y="3082890"/>
+            <a:off x="10104987" y="3082891"/>
             <a:ext cx="0" cy="851513"/>
           </a:xfrm>
           <a:prstGeom prst="straightConnector1">
@@ -3935,7 +3582,7 @@
         </p:nvSpPr>
         <p:spPr>
           <a:xfrm>
-            <a:off x="8912240" y="3360972"/>
+            <a:off x="9902842" y="3360974"/>
             <a:ext cx="355227" cy="265911"/>
           </a:xfrm>
           <a:prstGeom prst="rect">
@@ -3989,7 +3636,7 @@
         </p:nvSpPr>
         <p:spPr>
           <a:xfrm>
-            <a:off x="433632" y="2499543"/>
+            <a:off x="1424234" y="2499543"/>
             <a:ext cx="7191549" cy="3837030"/>
           </a:xfrm>
           <a:prstGeom prst="rect">
@@ -4023,13 +3670,7 @@
           <a:bodyPr lIns="502920" tIns="91440"/>
           <a:lstStyle/>
           <a:p>
-            <a:pPr eaLnBrk="1" fontAlgn="auto" hangingPunct="1">
-              <a:spcBef>
-                <a:spcPts val="0"/>
-              </a:spcBef>
-              <a:spcAft>
-                <a:spcPts val="0"/>
-              </a:spcAft>
+            <a:pPr>
               <a:defRPr/>
             </a:pPr>
             <a:endParaRPr lang="en-US" sz="1200" dirty="0">
@@ -4069,7 +3710,7 @@
         </p:blipFill>
         <p:spPr>
           <a:xfrm>
-            <a:off x="433632" y="2496831"/>
+            <a:off x="1424232" y="2496831"/>
             <a:ext cx="381000" cy="381000"/>
           </a:xfrm>
           <a:prstGeom prst="rect">
@@ -4091,7 +3732,7 @@
         </p:nvSpPr>
         <p:spPr>
           <a:xfrm>
-            <a:off x="2073564" y="3287339"/>
+            <a:off x="3064164" y="3287339"/>
             <a:ext cx="3245340" cy="2739748"/>
           </a:xfrm>
           <a:prstGeom prst="rect">
@@ -4127,13 +3768,7 @@
           <a:bodyPr lIns="502920" tIns="91440"/>
           <a:lstStyle/>
           <a:p>
-            <a:pPr eaLnBrk="1" fontAlgn="auto" hangingPunct="1">
-              <a:spcBef>
-                <a:spcPts val="0"/>
-              </a:spcBef>
-              <a:spcAft>
-                <a:spcPts val="0"/>
-              </a:spcAft>
+            <a:pPr>
               <a:defRPr/>
             </a:pPr>
             <a:r>
@@ -4179,7 +3814,7 @@
         </p:blipFill>
         <p:spPr>
           <a:xfrm>
-            <a:off x="2073564" y="3287339"/>
+            <a:off x="3064164" y="3287339"/>
             <a:ext cx="362580" cy="362580"/>
           </a:xfrm>
           <a:prstGeom prst="rect">
@@ -4203,7 +3838,7 @@
         </p:nvSpPr>
         <p:spPr bwMode="auto">
           <a:xfrm>
-            <a:off x="7827875" y="1000710"/>
+            <a:off x="8818477" y="1000712"/>
             <a:ext cx="951399" cy="430887"/>
           </a:xfrm>
           <a:prstGeom prst="rect">
@@ -4398,7 +4033,7 @@
         </p:blipFill>
         <p:spPr bwMode="auto">
           <a:xfrm>
-            <a:off x="8074325" y="519371"/>
+            <a:off x="9064925" y="519371"/>
             <a:ext cx="457200" cy="457200"/>
           </a:xfrm>
           <a:prstGeom prst="rect">
@@ -4458,7 +4093,7 @@
         </p:blipFill>
         <p:spPr bwMode="auto">
           <a:xfrm>
-            <a:off x="1800875" y="309468"/>
+            <a:off x="2791475" y="309468"/>
             <a:ext cx="612108" cy="612108"/>
           </a:xfrm>
           <a:prstGeom prst="rect">
@@ -4492,7 +4127,7 @@
         </p:nvSpPr>
         <p:spPr bwMode="auto">
           <a:xfrm>
-            <a:off x="2216524" y="400078"/>
+            <a:off x="3207124" y="400079"/>
             <a:ext cx="1362074" cy="430887"/>
           </a:xfrm>
           <a:prstGeom prst="rect">
@@ -4658,7 +4293,7 @@
         </p:nvSpPr>
         <p:spPr bwMode="auto">
           <a:xfrm>
-            <a:off x="789234" y="2553435"/>
+            <a:off x="1779835" y="2553437"/>
             <a:ext cx="1317695" cy="461665"/>
           </a:xfrm>
           <a:prstGeom prst="rect">
@@ -4822,7 +4457,7 @@
         </p:nvSpPr>
         <p:spPr>
           <a:xfrm>
-            <a:off x="1800875" y="309468"/>
+            <a:off x="2791476" y="309469"/>
             <a:ext cx="8267463" cy="1291133"/>
           </a:xfrm>
           <a:prstGeom prst="rect">
@@ -4856,13 +4491,7 @@
           <a:bodyPr lIns="502920" tIns="91440"/>
           <a:lstStyle/>
           <a:p>
-            <a:pPr eaLnBrk="1" fontAlgn="auto" hangingPunct="1">
-              <a:spcBef>
-                <a:spcPts val="0"/>
-              </a:spcBef>
-              <a:spcAft>
-                <a:spcPts val="0"/>
-              </a:spcAft>
+            <a:pPr>
               <a:defRPr/>
             </a:pPr>
             <a:endParaRPr lang="en-US" sz="1200" dirty="0">
@@ -4889,7 +4518,7 @@
         </p:nvGrpSpPr>
         <p:grpSpPr>
           <a:xfrm>
-            <a:off x="8529105" y="3988350"/>
+            <a:off x="9519707" y="3988350"/>
             <a:ext cx="1223471" cy="891029"/>
             <a:chOff x="5738827" y="3736551"/>
             <a:chExt cx="1223471" cy="891029"/>
@@ -5151,7 +4780,7 @@
         </p:blipFill>
         <p:spPr bwMode="auto">
           <a:xfrm>
-            <a:off x="6130004" y="541044"/>
+            <a:off x="7120605" y="541045"/>
             <a:ext cx="435527" cy="435527"/>
           </a:xfrm>
           <a:prstGeom prst="rect">
@@ -5198,7 +4827,7 @@
         </p:nvSpPr>
         <p:spPr bwMode="auto">
           <a:xfrm>
-            <a:off x="5872067" y="1012527"/>
+            <a:off x="6862669" y="1012529"/>
             <a:ext cx="951399" cy="430887"/>
           </a:xfrm>
           <a:prstGeom prst="rect">
@@ -5378,7 +5007,7 @@
         </p:nvGrpSpPr>
         <p:grpSpPr>
           <a:xfrm>
-            <a:off x="10177621" y="3934403"/>
+            <a:off x="11168223" y="3934404"/>
             <a:ext cx="1023077" cy="1080985"/>
             <a:chOff x="4952241" y="3073477"/>
             <a:chExt cx="1023077" cy="1080985"/>
@@ -5627,7 +5256,7 @@
         </p:nvSpPr>
         <p:spPr bwMode="auto">
           <a:xfrm>
-            <a:off x="3667554" y="1000710"/>
+            <a:off x="4658156" y="1000712"/>
             <a:ext cx="951399" cy="430887"/>
           </a:xfrm>
           <a:prstGeom prst="rect">
@@ -5804,7 +5433,7 @@
         </p:blipFill>
         <p:spPr bwMode="auto">
           <a:xfrm>
-            <a:off x="3911694" y="563507"/>
+            <a:off x="4902294" y="563507"/>
             <a:ext cx="400194" cy="400194"/>
           </a:xfrm>
           <a:prstGeom prst="rect">
@@ -5841,7 +5470,7 @@
         </p:nvCxnSpPr>
         <p:spPr bwMode="auto">
           <a:xfrm flipH="1">
-            <a:off x="4568094" y="3079806"/>
+            <a:off x="5558695" y="3079806"/>
             <a:ext cx="4546293" cy="0"/>
           </a:xfrm>
           <a:prstGeom prst="straightConnector1">
@@ -5884,7 +5513,7 @@
         </p:nvGrpSpPr>
         <p:grpSpPr>
           <a:xfrm>
-            <a:off x="917854" y="5111414"/>
+            <a:off x="1908456" y="5111413"/>
             <a:ext cx="1023077" cy="857280"/>
             <a:chOff x="4969916" y="3073477"/>
             <a:chExt cx="1023077" cy="857280"/>
@@ -6131,7 +5760,7 @@
         </p:nvGrpSpPr>
         <p:grpSpPr>
           <a:xfrm>
-            <a:off x="3965097" y="3976681"/>
+            <a:off x="4955699" y="3976681"/>
             <a:ext cx="1223471" cy="891029"/>
             <a:chOff x="5738827" y="3736551"/>
             <a:chExt cx="1223471" cy="891029"/>
@@ -6380,7 +6009,7 @@
         </p:nvSpPr>
         <p:spPr bwMode="auto">
           <a:xfrm>
-            <a:off x="2604899" y="4413828"/>
+            <a:off x="3595500" y="4413830"/>
             <a:ext cx="1362074" cy="430887"/>
           </a:xfrm>
           <a:prstGeom prst="rect">
@@ -6554,7 +6183,7 @@
         </p:blipFill>
         <p:spPr bwMode="auto">
           <a:xfrm>
-            <a:off x="3065825" y="3934403"/>
+            <a:off x="4056425" y="3934403"/>
             <a:ext cx="457200" cy="457200"/>
           </a:xfrm>
           <a:prstGeom prst="rect">
@@ -6599,7 +6228,7 @@
         </p:nvSpPr>
         <p:spPr>
           <a:xfrm>
-            <a:off x="7820148" y="2499542"/>
+            <a:off x="8810749" y="2499543"/>
             <a:ext cx="3848755" cy="3837007"/>
           </a:xfrm>
           <a:prstGeom prst="rect">
@@ -6633,13 +6262,7 @@
           <a:bodyPr lIns="502920" tIns="91440"/>
           <a:lstStyle/>
           <a:p>
-            <a:pPr eaLnBrk="1" fontAlgn="auto" hangingPunct="1">
-              <a:spcBef>
-                <a:spcPts val="0"/>
-              </a:spcBef>
-              <a:spcAft>
-                <a:spcPts val="0"/>
-              </a:spcAft>
+            <a:pPr>
               <a:defRPr/>
             </a:pPr>
             <a:endParaRPr lang="en-US" sz="1200" dirty="0">
@@ -6679,7 +6302,7 @@
         </p:blipFill>
         <p:spPr>
           <a:xfrm>
-            <a:off x="7827875" y="2505418"/>
+            <a:off x="8818475" y="2505418"/>
             <a:ext cx="381000" cy="381000"/>
           </a:xfrm>
           <a:prstGeom prst="rect">
@@ -6703,7 +6326,7 @@
         </p:nvSpPr>
         <p:spPr bwMode="auto">
           <a:xfrm>
-            <a:off x="8181813" y="2565488"/>
+            <a:off x="9172415" y="2565490"/>
             <a:ext cx="1312041" cy="276999"/>
           </a:xfrm>
           <a:prstGeom prst="rect">
@@ -6867,7 +6490,7 @@
         </p:nvSpPr>
         <p:spPr>
           <a:xfrm>
-            <a:off x="8200088" y="3288480"/>
+            <a:off x="9190688" y="3288480"/>
             <a:ext cx="1771978" cy="1817790"/>
           </a:xfrm>
           <a:prstGeom prst="rect">
@@ -6904,13 +6527,7 @@
           <a:bodyPr lIns="502920" tIns="91440"/>
           <a:lstStyle/>
           <a:p>
-            <a:pPr eaLnBrk="1" fontAlgn="auto" hangingPunct="1">
-              <a:spcBef>
-                <a:spcPts val="0"/>
-              </a:spcBef>
-              <a:spcAft>
-                <a:spcPts val="0"/>
-              </a:spcAft>
+            <a:pPr>
               <a:defRPr/>
             </a:pPr>
             <a:r>
@@ -6956,7 +6573,7 @@
         </p:blipFill>
         <p:spPr>
           <a:xfrm>
-            <a:off x="8193838" y="3288480"/>
+            <a:off x="9184438" y="3288480"/>
             <a:ext cx="410582" cy="381000"/>
           </a:xfrm>
           <a:prstGeom prst="rect">
@@ -6978,7 +6595,7 @@
         </p:nvGrpSpPr>
         <p:grpSpPr>
           <a:xfrm>
-            <a:off x="5873661" y="3992832"/>
+            <a:off x="6864263" y="3992832"/>
             <a:ext cx="1223471" cy="891029"/>
             <a:chOff x="5738827" y="3736551"/>
             <a:chExt cx="1223471" cy="891029"/>
@@ -7225,7 +6842,7 @@
         </p:nvSpPr>
         <p:spPr>
           <a:xfrm>
-            <a:off x="5544644" y="3292962"/>
+            <a:off x="6535244" y="3292962"/>
             <a:ext cx="1771978" cy="1817790"/>
           </a:xfrm>
           <a:prstGeom prst="rect">
@@ -7262,13 +6879,7 @@
           <a:bodyPr lIns="502920" tIns="91440"/>
           <a:lstStyle/>
           <a:p>
-            <a:pPr eaLnBrk="1" fontAlgn="auto" hangingPunct="1">
-              <a:spcBef>
-                <a:spcPts val="0"/>
-              </a:spcBef>
-              <a:spcAft>
-                <a:spcPts val="0"/>
-              </a:spcAft>
+            <a:pPr>
               <a:defRPr/>
             </a:pPr>
             <a:r>
@@ -7314,7 +6925,7 @@
         </p:blipFill>
         <p:spPr>
           <a:xfrm>
-            <a:off x="5538394" y="3292962"/>
+            <a:off x="6528994" y="3292962"/>
             <a:ext cx="410582" cy="381000"/>
           </a:xfrm>
           <a:prstGeom prst="rect">
@@ -7336,7 +6947,7 @@
         </p:nvGrpSpPr>
         <p:grpSpPr>
           <a:xfrm>
-            <a:off x="5919094" y="5230336"/>
+            <a:off x="6909696" y="5230336"/>
             <a:ext cx="1023077" cy="857280"/>
             <a:chOff x="4969916" y="3073477"/>
             <a:chExt cx="1023077" cy="857280"/>
@@ -7583,7 +7194,7 @@
         </p:nvGrpSpPr>
         <p:grpSpPr>
           <a:xfrm>
-            <a:off x="8589658" y="5230336"/>
+            <a:off x="9580259" y="5230336"/>
             <a:ext cx="1023077" cy="857280"/>
             <a:chOff x="4969916" y="3073477"/>
             <a:chExt cx="1023077" cy="857280"/>
@@ -7830,7 +7441,7 @@
         </p:nvGrpSpPr>
         <p:grpSpPr>
           <a:xfrm>
-            <a:off x="900180" y="3924456"/>
+            <a:off x="1890782" y="3924457"/>
             <a:ext cx="1023077" cy="1080985"/>
             <a:chOff x="4952241" y="3073477"/>
             <a:chExt cx="1023077" cy="1080985"/>
@@ -8079,7 +7690,7 @@
         </p:nvCxnSpPr>
         <p:spPr bwMode="auto">
           <a:xfrm>
-            <a:off x="4568094" y="3074016"/>
+            <a:off x="5558694" y="3074016"/>
             <a:ext cx="0" cy="806482"/>
           </a:xfrm>
           <a:prstGeom prst="straightConnector1">
@@ -8124,7 +7735,7 @@
         </p:nvCxnSpPr>
         <p:spPr bwMode="auto">
           <a:xfrm>
-            <a:off x="4129367" y="1461053"/>
+            <a:off x="5119967" y="1461055"/>
             <a:ext cx="0" cy="1612963"/>
           </a:xfrm>
           <a:prstGeom prst="straightConnector1">
@@ -8169,7 +7780,7 @@
         </p:nvCxnSpPr>
         <p:spPr bwMode="auto">
           <a:xfrm>
-            <a:off x="3287498" y="3074016"/>
+            <a:off x="4278100" y="3074016"/>
             <a:ext cx="841869" cy="0"/>
           </a:xfrm>
           <a:prstGeom prst="straightConnector1">
@@ -8214,7 +7825,7 @@
         </p:nvCxnSpPr>
         <p:spPr bwMode="auto">
           <a:xfrm>
-            <a:off x="6313357" y="1461053"/>
+            <a:off x="7303957" y="1461054"/>
             <a:ext cx="0" cy="670414"/>
           </a:xfrm>
           <a:prstGeom prst="straightConnector1">
@@ -8259,7 +7870,7 @@
         </p:nvCxnSpPr>
         <p:spPr bwMode="auto">
           <a:xfrm>
-            <a:off x="10689160" y="2129031"/>
+            <a:off x="11679760" y="2129031"/>
             <a:ext cx="0" cy="1805372"/>
           </a:xfrm>
           <a:prstGeom prst="straightConnector1">
@@ -8317,7 +7928,7 @@
         </p:blipFill>
         <p:spPr bwMode="auto">
           <a:xfrm>
-            <a:off x="3059703" y="5032854"/>
+            <a:off x="4050303" y="5032854"/>
             <a:ext cx="394940" cy="394940"/>
           </a:xfrm>
           <a:prstGeom prst="rect">
@@ -8364,7 +7975,7 @@
         </p:nvSpPr>
         <p:spPr bwMode="auto">
           <a:xfrm>
-            <a:off x="2737513" y="5422802"/>
+            <a:off x="3728114" y="5422803"/>
             <a:ext cx="1023077" cy="461665"/>
           </a:xfrm>
           <a:prstGeom prst="rect">
@@ -8558,7 +8169,7 @@
         </p:nvSpPr>
         <p:spPr>
           <a:xfrm>
-            <a:off x="1270467" y="2410326"/>
+            <a:off x="2261068" y="2410326"/>
             <a:ext cx="355227" cy="654886"/>
           </a:xfrm>
           <a:prstGeom prst="rect">
@@ -8612,7 +8223,7 @@
         </p:nvSpPr>
         <p:spPr>
           <a:xfrm>
-            <a:off x="8125310" y="1990529"/>
+            <a:off x="9115912" y="1990530"/>
             <a:ext cx="355227" cy="277005"/>
           </a:xfrm>
           <a:prstGeom prst="rect">
@@ -8666,7 +8277,7 @@
         </p:nvSpPr>
         <p:spPr>
           <a:xfrm>
-            <a:off x="3961492" y="2009215"/>
+            <a:off x="4952093" y="2009217"/>
             <a:ext cx="355227" cy="277005"/>
           </a:xfrm>
           <a:prstGeom prst="rect">
@@ -8720,7 +8331,7 @@
         </p:nvSpPr>
         <p:spPr>
           <a:xfrm>
-            <a:off x="7871134" y="2441182"/>
+            <a:off x="8861736" y="2441182"/>
             <a:ext cx="355227" cy="509472"/>
           </a:xfrm>
           <a:prstGeom prst="rect">
@@ -8774,7 +8385,7 @@
         </p:nvSpPr>
         <p:spPr>
           <a:xfrm>
-            <a:off x="3115180" y="3340216"/>
+            <a:off x="4105782" y="3340218"/>
             <a:ext cx="355227" cy="277005"/>
           </a:xfrm>
           <a:prstGeom prst="rect">
@@ -8816,10 +8427,10 @@
       </p:sp>
       <p:sp>
         <p:nvSpPr>
-          <p:cNvPr id="113" name="Rectangle 112">
+          <p:cNvPr id="112" name="Rectangle 111">
             <a:extLst>
               <a:ext uri="{FF2B5EF4-FFF2-40B4-BE49-F238E27FC236}">
-                <a16:creationId xmlns:a16="http://schemas.microsoft.com/office/drawing/2014/main" id="{C9E452B5-DF69-906F-A7D8-35171F5EFB0E}"/>
+                <a16:creationId xmlns:a16="http://schemas.microsoft.com/office/drawing/2014/main" id="{AB3289C0-AAFD-E270-BE04-33C13B742149}"/>
               </a:ext>
             </a:extLst>
           </p:cNvPr>
@@ -8828,8 +8439,8 @@
         </p:nvSpPr>
         <p:spPr>
           <a:xfrm>
-            <a:off x="6313357" y="3372914"/>
-            <a:ext cx="355227" cy="277005"/>
+            <a:off x="9902842" y="3360974"/>
+            <a:ext cx="355227" cy="265911"/>
           </a:xfrm>
           <a:prstGeom prst="rect">
             <a:avLst/>
@@ -8870,60 +8481,6 @@
       </p:sp>
       <p:sp>
         <p:nvSpPr>
-          <p:cNvPr id="112" name="Rectangle 111">
-            <a:extLst>
-              <a:ext uri="{FF2B5EF4-FFF2-40B4-BE49-F238E27FC236}">
-                <a16:creationId xmlns:a16="http://schemas.microsoft.com/office/drawing/2014/main" id="{AB3289C0-AAFD-E270-BE04-33C13B742149}"/>
-              </a:ext>
-            </a:extLst>
-          </p:cNvPr>
-          <p:cNvSpPr/>
-          <p:nvPr/>
-        </p:nvSpPr>
-        <p:spPr>
-          <a:xfrm>
-            <a:off x="8912240" y="3360972"/>
-            <a:ext cx="355227" cy="265911"/>
-          </a:xfrm>
-          <a:prstGeom prst="rect">
-            <a:avLst/>
-          </a:prstGeom>
-          <a:solidFill>
-            <a:schemeClr val="bg1"/>
-          </a:solidFill>
-          <a:ln>
-            <a:solidFill>
-              <a:schemeClr val="bg1"/>
-            </a:solidFill>
-          </a:ln>
-        </p:spPr>
-        <p:style>
-          <a:lnRef idx="2">
-            <a:schemeClr val="accent1">
-              <a:shade val="50000"/>
-            </a:schemeClr>
-          </a:lnRef>
-          <a:fillRef idx="1">
-            <a:schemeClr val="accent1"/>
-          </a:fillRef>
-          <a:effectRef idx="0">
-            <a:schemeClr val="accent1"/>
-          </a:effectRef>
-          <a:fontRef idx="minor">
-            <a:schemeClr val="lt1"/>
-          </a:fontRef>
-        </p:style>
-        <p:txBody>
-          <a:bodyPr rtlCol="0" anchor="ctr"/>
-          <a:lstStyle/>
-          <a:p>
-            <a:pPr algn="ctr"/>
-            <a:endParaRPr lang="en-US"/>
-          </a:p>
-        </p:txBody>
-      </p:sp>
-      <p:sp>
-        <p:nvSpPr>
           <p:cNvPr id="30" name="TextBox 22">
             <a:extLst>
               <a:ext uri="{FF2B5EF4-FFF2-40B4-BE49-F238E27FC236}">
@@ -8938,7 +8495,7 @@
         </p:nvSpPr>
         <p:spPr bwMode="auto">
           <a:xfrm>
-            <a:off x="6568311" y="1571331"/>
+            <a:off x="8251456" y="1407227"/>
             <a:ext cx="1040374" cy="461665"/>
           </a:xfrm>
           <a:prstGeom prst="rect">
@@ -9110,7 +8667,7 @@
         </p:nvSpPr>
         <p:spPr bwMode="auto">
           <a:xfrm>
-            <a:off x="8612449" y="3707895"/>
+            <a:off x="9846844" y="3843600"/>
             <a:ext cx="1223471" cy="461665"/>
           </a:xfrm>
           <a:prstGeom prst="rect">
@@ -9271,7 +8828,7 @@
         </p:nvSpPr>
         <p:spPr bwMode="auto">
           <a:xfrm>
-            <a:off x="4844021" y="1595989"/>
+            <a:off x="6304195" y="1436444"/>
             <a:ext cx="1151786" cy="461665"/>
           </a:xfrm>
           <a:prstGeom prst="rect">
@@ -9443,7 +9000,7 @@
         </p:nvSpPr>
         <p:spPr bwMode="auto">
           <a:xfrm>
-            <a:off x="10236067" y="3041761"/>
+            <a:off x="11494056" y="3245808"/>
             <a:ext cx="1023077" cy="461665"/>
           </a:xfrm>
           <a:prstGeom prst="rect">
@@ -9604,7 +9161,7 @@
         </p:nvSpPr>
         <p:spPr bwMode="auto">
           <a:xfrm>
-            <a:off x="3338835" y="1557769"/>
+            <a:off x="4378958" y="1438460"/>
             <a:ext cx="1040374" cy="461665"/>
           </a:xfrm>
           <a:prstGeom prst="rect">
@@ -9765,7 +9322,7 @@
         </p:nvSpPr>
         <p:spPr bwMode="auto">
           <a:xfrm>
-            <a:off x="695281" y="5189368"/>
+            <a:off x="1808968" y="5301024"/>
             <a:ext cx="1023077" cy="461665"/>
           </a:xfrm>
           <a:prstGeom prst="rect">
@@ -9926,7 +9483,7 @@
         </p:nvSpPr>
         <p:spPr bwMode="auto">
           <a:xfrm>
-            <a:off x="3840780" y="3724262"/>
+            <a:off x="4690937" y="3843599"/>
             <a:ext cx="1223471" cy="461665"/>
           </a:xfrm>
           <a:prstGeom prst="rect">
@@ -10087,7 +9644,7 @@
         </p:nvSpPr>
         <p:spPr bwMode="auto">
           <a:xfrm>
-            <a:off x="2356080" y="3719693"/>
+            <a:off x="3124953" y="3831616"/>
             <a:ext cx="1362074" cy="461665"/>
           </a:xfrm>
           <a:prstGeom prst="rect">
@@ -10261,7 +9818,7 @@
         </p:blipFill>
         <p:spPr bwMode="auto">
           <a:xfrm>
-            <a:off x="2835593" y="3262493"/>
+            <a:off x="3582935" y="3315808"/>
             <a:ext cx="457200" cy="457200"/>
           </a:xfrm>
           <a:prstGeom prst="rect">
@@ -10319,7 +9876,7 @@
         </p:blipFill>
         <p:spPr>
           <a:xfrm>
-            <a:off x="7776874" y="2388581"/>
+            <a:off x="9139573" y="2400320"/>
             <a:ext cx="381000" cy="381000"/>
           </a:xfrm>
           <a:prstGeom prst="rect">
@@ -10343,7 +9900,7 @@
         </p:nvSpPr>
         <p:spPr bwMode="auto">
           <a:xfrm>
-            <a:off x="5859932" y="3713184"/>
+            <a:off x="6744801" y="3837756"/>
             <a:ext cx="1223471" cy="461665"/>
           </a:xfrm>
           <a:prstGeom prst="rect">
@@ -10504,7 +10061,7 @@
         </p:nvSpPr>
         <p:spPr bwMode="auto">
           <a:xfrm>
-            <a:off x="724331" y="4313382"/>
+            <a:off x="1839798" y="4368614"/>
             <a:ext cx="1023077" cy="461665"/>
           </a:xfrm>
           <a:prstGeom prst="rect">
@@ -10665,7 +10222,7 @@
         </p:nvSpPr>
         <p:spPr bwMode="auto">
           <a:xfrm>
-            <a:off x="10236067" y="4006080"/>
+            <a:off x="11494055" y="4127333"/>
             <a:ext cx="1023077" cy="461665"/>
           </a:xfrm>
           <a:prstGeom prst="rect">
@@ -10826,7 +10383,7 @@
         </p:nvSpPr>
         <p:spPr bwMode="auto">
           <a:xfrm>
-            <a:off x="649351" y="6094764"/>
+            <a:off x="1785491" y="3396052"/>
             <a:ext cx="1023077" cy="461665"/>
           </a:xfrm>
           <a:prstGeom prst="rect">
@@ -10987,7 +10544,7 @@
         </p:nvSpPr>
         <p:spPr bwMode="auto">
           <a:xfrm>
-            <a:off x="2552654" y="5270033"/>
+            <a:off x="3268297" y="5301024"/>
             <a:ext cx="1023077" cy="461665"/>
           </a:xfrm>
           <a:prstGeom prst="rect">
@@ -11146,7 +10703,7 @@
         </p:nvSpPr>
         <p:spPr>
           <a:xfrm>
-            <a:off x="2071067" y="2781319"/>
+            <a:off x="3027020" y="2781320"/>
             <a:ext cx="3115811" cy="3084643"/>
           </a:xfrm>
           <a:prstGeom prst="rect">
@@ -11180,13 +10737,7 @@
           <a:bodyPr lIns="502920" tIns="91440"/>
           <a:lstStyle/>
           <a:p>
-            <a:pPr eaLnBrk="1" fontAlgn="auto" hangingPunct="1">
-              <a:spcBef>
-                <a:spcPts val="0"/>
-              </a:spcBef>
-              <a:spcAft>
-                <a:spcPts val="0"/>
-              </a:spcAft>
+            <a:pPr>
               <a:defRPr/>
             </a:pPr>
             <a:r>
@@ -11229,7 +10780,7 @@
         </p:blipFill>
         <p:spPr>
           <a:xfrm>
-            <a:off x="2064534" y="2771096"/>
+            <a:off x="3020543" y="2771096"/>
             <a:ext cx="381000" cy="381000"/>
           </a:xfrm>
           <a:prstGeom prst="rect">
@@ -11251,8 +10802,8 @@
         </p:nvSpPr>
         <p:spPr>
           <a:xfrm>
-            <a:off x="5503103" y="2781319"/>
-            <a:ext cx="1888246" cy="1536583"/>
+            <a:off x="6376218" y="2781320"/>
+            <a:ext cx="1888246" cy="1576846"/>
           </a:xfrm>
           <a:prstGeom prst="rect">
             <a:avLst/>
@@ -11285,13 +10836,7 @@
           <a:bodyPr lIns="502920" tIns="91440"/>
           <a:lstStyle/>
           <a:p>
-            <a:pPr eaLnBrk="1" fontAlgn="auto" hangingPunct="1">
-              <a:spcBef>
-                <a:spcPts val="0"/>
-              </a:spcBef>
-              <a:spcAft>
-                <a:spcPts val="0"/>
-              </a:spcAft>
+            <a:pPr>
               <a:defRPr/>
             </a:pPr>
             <a:r>
@@ -11334,7 +10879,7 @@
         </p:blipFill>
         <p:spPr>
           <a:xfrm>
-            <a:off x="5496325" y="2771096"/>
+            <a:off x="6374799" y="2776002"/>
             <a:ext cx="381000" cy="381000"/>
           </a:xfrm>
           <a:prstGeom prst="rect">
@@ -11356,7 +10901,7 @@
         </p:nvSpPr>
         <p:spPr>
           <a:xfrm>
-            <a:off x="8317703" y="2776581"/>
+            <a:off x="9624784" y="2856224"/>
             <a:ext cx="1714896" cy="1541322"/>
           </a:xfrm>
           <a:prstGeom prst="rect">
@@ -11390,13 +10935,7 @@
           <a:bodyPr lIns="502920" tIns="91440"/>
           <a:lstStyle/>
           <a:p>
-            <a:pPr eaLnBrk="1" fontAlgn="auto" hangingPunct="1">
-              <a:spcBef>
-                <a:spcPts val="0"/>
-              </a:spcBef>
-              <a:spcAft>
-                <a:spcPts val="0"/>
-              </a:spcAft>
+            <a:pPr>
               <a:defRPr/>
             </a:pPr>
             <a:r>
@@ -11439,7 +10978,7 @@
         </p:blipFill>
         <p:spPr>
           <a:xfrm>
-            <a:off x="8309174" y="2760154"/>
+            <a:off x="9624784" y="2857520"/>
             <a:ext cx="381000" cy="381000"/>
           </a:xfrm>
           <a:prstGeom prst="rect">
@@ -11474,7 +11013,7 @@
         </p:blipFill>
         <p:spPr bwMode="auto">
           <a:xfrm>
-            <a:off x="2683192" y="4427368"/>
+            <a:off x="3405347" y="4507674"/>
             <a:ext cx="762000" cy="762000"/>
           </a:xfrm>
           <a:prstGeom prst="rect">
@@ -11533,7 +11072,7 @@
         </p:blipFill>
         <p:spPr>
           <a:xfrm>
-            <a:off x="10519005" y="2608012"/>
+            <a:off x="11776995" y="2821659"/>
             <a:ext cx="457200" cy="457200"/>
           </a:xfrm>
           <a:prstGeom prst="rect">
@@ -11569,7 +11108,7 @@
         </p:blipFill>
         <p:spPr>
           <a:xfrm>
-            <a:off x="10519005" y="3566939"/>
+            <a:off x="11776995" y="3717420"/>
             <a:ext cx="457200" cy="457200"/>
           </a:xfrm>
           <a:prstGeom prst="rect">
@@ -11605,7 +11144,7 @@
         </p:blipFill>
         <p:spPr>
           <a:xfrm>
-            <a:off x="978220" y="3880913"/>
+            <a:off x="2098614" y="3926648"/>
             <a:ext cx="457200" cy="457200"/>
           </a:xfrm>
           <a:prstGeom prst="rect">
@@ -11641,7 +11180,7 @@
         </p:blipFill>
         <p:spPr>
           <a:xfrm>
-            <a:off x="978220" y="4775047"/>
+            <a:off x="2109025" y="4894745"/>
             <a:ext cx="457200" cy="457200"/>
           </a:xfrm>
           <a:prstGeom prst="rect">
@@ -11677,7 +11216,7 @@
         </p:blipFill>
         <p:spPr>
           <a:xfrm>
-            <a:off x="978219" y="5709444"/>
+            <a:off x="2109025" y="2928402"/>
             <a:ext cx="457200" cy="457200"/>
           </a:xfrm>
           <a:prstGeom prst="rect">
@@ -11713,7 +11252,7 @@
         </p:blipFill>
         <p:spPr>
           <a:xfrm>
-            <a:off x="8995584" y="3259488"/>
+            <a:off x="10270684" y="3290596"/>
             <a:ext cx="457200" cy="457200"/>
           </a:xfrm>
           <a:prstGeom prst="rect">
@@ -11749,7 +11288,7 @@
         </p:blipFill>
         <p:spPr>
           <a:xfrm>
-            <a:off x="6201316" y="3259488"/>
+            <a:off x="7124313" y="3290596"/>
             <a:ext cx="457200" cy="457200"/>
           </a:xfrm>
           <a:prstGeom prst="rect">
@@ -11785,7 +11324,7 @@
         </p:blipFill>
         <p:spPr>
           <a:xfrm>
-            <a:off x="4154507" y="3267062"/>
+            <a:off x="5079151" y="3290596"/>
             <a:ext cx="457200" cy="457200"/>
           </a:xfrm>
           <a:prstGeom prst="rect">
@@ -11820,7 +11359,7 @@
         </p:blipFill>
         <p:spPr bwMode="auto">
           <a:xfrm>
-            <a:off x="5038914" y="864831"/>
+            <a:off x="6469241" y="715429"/>
             <a:ext cx="762000" cy="762000"/>
           </a:xfrm>
           <a:prstGeom prst="rect">
@@ -11879,7 +11418,7 @@
         </p:blipFill>
         <p:spPr>
           <a:xfrm>
-            <a:off x="6854803" y="1062193"/>
+            <a:off x="8582149" y="886078"/>
             <a:ext cx="457200" cy="457200"/>
           </a:xfrm>
           <a:prstGeom prst="rect">
@@ -11901,8 +11440,8 @@
         </p:nvSpPr>
         <p:spPr>
           <a:xfrm>
-            <a:off x="361733" y="2390096"/>
-            <a:ext cx="7272092" cy="4390266"/>
+            <a:off x="1569228" y="2390096"/>
+            <a:ext cx="6961088" cy="3625268"/>
           </a:xfrm>
           <a:prstGeom prst="rect">
             <a:avLst/>
@@ -11934,13 +11473,7 @@
           <a:bodyPr lIns="502920" tIns="91440"/>
           <a:lstStyle/>
           <a:p>
-            <a:pPr eaLnBrk="1" fontAlgn="auto" hangingPunct="1">
-              <a:spcBef>
-                <a:spcPts val="0"/>
-              </a:spcBef>
-              <a:spcAft>
-                <a:spcPts val="0"/>
-              </a:spcAft>
+            <a:pPr>
               <a:defRPr/>
             </a:pPr>
             <a:r>
@@ -11983,7 +11516,7 @@
         </p:blipFill>
         <p:spPr>
           <a:xfrm>
-            <a:off x="361733" y="2400883"/>
+            <a:off x="1570157" y="2375935"/>
             <a:ext cx="381000" cy="381000"/>
           </a:xfrm>
           <a:prstGeom prst="rect">
@@ -12005,8 +11538,8 @@
         </p:nvSpPr>
         <p:spPr>
           <a:xfrm>
-            <a:off x="7776874" y="2390096"/>
-            <a:ext cx="3892021" cy="2308295"/>
+            <a:off x="9139573" y="2390095"/>
+            <a:ext cx="3463290" cy="2382431"/>
           </a:xfrm>
           <a:prstGeom prst="rect">
             <a:avLst/>
@@ -12038,13 +11571,7 @@
           <a:bodyPr lIns="502920" tIns="91440"/>
           <a:lstStyle/>
           <a:p>
-            <a:pPr eaLnBrk="1" fontAlgn="auto" hangingPunct="1">
-              <a:spcBef>
-                <a:spcPts val="0"/>
-              </a:spcBef>
-              <a:spcAft>
-                <a:spcPts val="0"/>
-              </a:spcAft>
+            <a:pPr>
               <a:defRPr/>
             </a:pPr>
             <a:r>
@@ -12087,7 +11614,7 @@
         </p:blipFill>
         <p:spPr bwMode="auto">
           <a:xfrm>
-            <a:off x="3630422" y="1017231"/>
+            <a:off x="4672506" y="842636"/>
             <a:ext cx="457200" cy="457200"/>
           </a:xfrm>
           <a:prstGeom prst="rect">
@@ -12134,8 +11661,8 @@
         </p:nvCxnSpPr>
         <p:spPr>
           <a:xfrm>
-            <a:off x="4635089" y="3478718"/>
-            <a:ext cx="1554480" cy="0"/>
+            <a:off x="5612379" y="3521156"/>
+            <a:ext cx="1463040" cy="0"/>
           </a:xfrm>
           <a:prstGeom prst="straightConnector1">
             <a:avLst/>
@@ -12179,8 +11706,8 @@
         </p:nvCxnSpPr>
         <p:spPr>
           <a:xfrm>
-            <a:off x="6680331" y="3488932"/>
-            <a:ext cx="2286000" cy="0"/>
+            <a:off x="7683969" y="3519165"/>
+            <a:ext cx="2468880" cy="0"/>
           </a:xfrm>
           <a:prstGeom prst="straightConnector1">
             <a:avLst/>
@@ -12222,8 +11749,8 @@
         </p:nvSpPr>
         <p:spPr>
           <a:xfrm>
-            <a:off x="2885578" y="441430"/>
-            <a:ext cx="4985556" cy="1701137"/>
+            <a:off x="3882189" y="258522"/>
+            <a:ext cx="5654424" cy="1738946"/>
           </a:xfrm>
           <a:prstGeom prst="rect">
             <a:avLst/>
@@ -12272,13 +11799,7 @@
             </a:r>
           </a:p>
           <a:p>
-            <a:pPr algn="ctr" eaLnBrk="1" fontAlgn="auto" hangingPunct="1">
-              <a:spcBef>
-                <a:spcPts val="0"/>
-              </a:spcBef>
-              <a:spcAft>
-                <a:spcPts val="0"/>
-              </a:spcAft>
+            <a:pPr algn="ctr">
               <a:defRPr/>
             </a:pPr>
             <a:endParaRPr lang="en-US" sz="1200" dirty="0">
@@ -12291,12 +11812,209 @@
           </a:p>
         </p:txBody>
       </p:sp>
+      <p:pic>
+        <p:nvPicPr>
+          <p:cNvPr id="143" name="Graphic 142">
+            <a:extLst>
+              <a:ext uri="{FF2B5EF4-FFF2-40B4-BE49-F238E27FC236}">
+                <a16:creationId xmlns:a16="http://schemas.microsoft.com/office/drawing/2014/main" id="{EF2EDF4D-8DA7-413B-A99C-A29EC468E16F}"/>
+              </a:ext>
+            </a:extLst>
+          </p:cNvPr>
+          <p:cNvPicPr>
+            <a:picLocks noChangeAspect="1"/>
+          </p:cNvPicPr>
+          <p:nvPr/>
+        </p:nvPicPr>
+        <p:blipFill>
+          <a:blip r:embed="rId19">
+            <a:extLst>
+              <a:ext uri="{96DAC541-7B7A-43D3-8B79-37D633B846F1}">
+                <asvg:svgBlip xmlns:asvg="http://schemas.microsoft.com/office/drawing/2016/SVG/main" r:embed="rId20"/>
+              </a:ext>
+            </a:extLst>
+          </a:blip>
+          <a:stretch>
+            <a:fillRect/>
+          </a:stretch>
+        </p:blipFill>
+        <p:spPr>
+          <a:xfrm>
+            <a:off x="7124313" y="4674765"/>
+            <a:ext cx="457200" cy="457200"/>
+          </a:xfrm>
+          <a:prstGeom prst="rect">
+            <a:avLst/>
+          </a:prstGeom>
+        </p:spPr>
+      </p:pic>
       <p:sp>
         <p:nvSpPr>
-          <p:cNvPr id="137" name="Freeform 59">
+          <p:cNvPr id="145" name="TextBox 11">
             <a:extLst>
               <a:ext uri="{FF2B5EF4-FFF2-40B4-BE49-F238E27FC236}">
-                <a16:creationId xmlns:a16="http://schemas.microsoft.com/office/drawing/2014/main" id="{71F0E08A-1F58-4C03-9C28-135AE40D0274}"/>
+                <a16:creationId xmlns:a16="http://schemas.microsoft.com/office/drawing/2014/main" id="{AB85A129-3A6C-4800-96BA-333F30145C46}"/>
+              </a:ext>
+            </a:extLst>
+          </p:cNvPr>
+          <p:cNvSpPr txBox="1">
+            <a:spLocks noChangeArrowheads="1"/>
+          </p:cNvSpPr>
+          <p:nvPr/>
+        </p:nvSpPr>
+        <p:spPr bwMode="auto">
+          <a:xfrm>
+            <a:off x="6446707" y="5256077"/>
+            <a:ext cx="1848463" cy="461665"/>
+          </a:xfrm>
+          <a:prstGeom prst="rect">
+            <a:avLst/>
+          </a:prstGeom>
+          <a:noFill/>
+          <a:ln>
+            <a:noFill/>
+          </a:ln>
+          <a:extLst>
+            <a:ext uri="{909E8E84-426E-40DD-AFC4-6F175D3DCCD1}">
+              <a14:hiddenFill xmlns:a14="http://schemas.microsoft.com/office/drawing/2010/main">
+                <a:solidFill>
+                  <a:srgbClr val="FFFFFF"/>
+                </a:solidFill>
+              </a14:hiddenFill>
+            </a:ext>
+            <a:ext uri="{91240B29-F687-4F45-9708-019B960494DF}">
+              <a14:hiddenLine xmlns:a14="http://schemas.microsoft.com/office/drawing/2010/main" w="9525">
+                <a:solidFill>
+                  <a:srgbClr val="000000"/>
+                </a:solidFill>
+                <a:miter lim="800000"/>
+                <a:headEnd/>
+                <a:tailEnd/>
+              </a14:hiddenLine>
+            </a:ext>
+          </a:extLst>
+        </p:spPr>
+        <p:txBody>
+          <a:bodyPr wrap="square">
+            <a:spAutoFit/>
+          </a:bodyPr>
+          <a:lstStyle>
+            <a:lvl1pPr>
+              <a:defRPr>
+                <a:solidFill>
+                  <a:schemeClr val="tx1"/>
+                </a:solidFill>
+                <a:latin typeface="Calibri" panose="020F0502020204030204" pitchFamily="34" charset="0"/>
+              </a:defRPr>
+            </a:lvl1pPr>
+            <a:lvl2pPr marL="742950" indent="-285750">
+              <a:defRPr>
+                <a:solidFill>
+                  <a:schemeClr val="tx1"/>
+                </a:solidFill>
+                <a:latin typeface="Calibri" panose="020F0502020204030204" pitchFamily="34" charset="0"/>
+              </a:defRPr>
+            </a:lvl2pPr>
+            <a:lvl3pPr marL="1143000" indent="-228600">
+              <a:defRPr>
+                <a:solidFill>
+                  <a:schemeClr val="tx1"/>
+                </a:solidFill>
+                <a:latin typeface="Calibri" panose="020F0502020204030204" pitchFamily="34" charset="0"/>
+              </a:defRPr>
+            </a:lvl3pPr>
+            <a:lvl4pPr marL="1600200" indent="-228600">
+              <a:defRPr>
+                <a:solidFill>
+                  <a:schemeClr val="tx1"/>
+                </a:solidFill>
+                <a:latin typeface="Calibri" panose="020F0502020204030204" pitchFamily="34" charset="0"/>
+              </a:defRPr>
+            </a:lvl4pPr>
+            <a:lvl5pPr marL="2057400" indent="-228600">
+              <a:defRPr>
+                <a:solidFill>
+                  <a:schemeClr val="tx1"/>
+                </a:solidFill>
+                <a:latin typeface="Calibri" panose="020F0502020204030204" pitchFamily="34" charset="0"/>
+              </a:defRPr>
+            </a:lvl5pPr>
+            <a:lvl6pPr marL="2514600" indent="-228600" eaLnBrk="0" fontAlgn="base" hangingPunct="0">
+              <a:spcBef>
+                <a:spcPct val="0"/>
+              </a:spcBef>
+              <a:spcAft>
+                <a:spcPct val="0"/>
+              </a:spcAft>
+              <a:defRPr>
+                <a:solidFill>
+                  <a:schemeClr val="tx1"/>
+                </a:solidFill>
+                <a:latin typeface="Calibri" panose="020F0502020204030204" pitchFamily="34" charset="0"/>
+              </a:defRPr>
+            </a:lvl6pPr>
+            <a:lvl7pPr marL="2971800" indent="-228600" eaLnBrk="0" fontAlgn="base" hangingPunct="0">
+              <a:spcBef>
+                <a:spcPct val="0"/>
+              </a:spcBef>
+              <a:spcAft>
+                <a:spcPct val="0"/>
+              </a:spcAft>
+              <a:defRPr>
+                <a:solidFill>
+                  <a:schemeClr val="tx1"/>
+                </a:solidFill>
+                <a:latin typeface="Calibri" panose="020F0502020204030204" pitchFamily="34" charset="0"/>
+              </a:defRPr>
+            </a:lvl7pPr>
+            <a:lvl8pPr marL="3429000" indent="-228600" eaLnBrk="0" fontAlgn="base" hangingPunct="0">
+              <a:spcBef>
+                <a:spcPct val="0"/>
+              </a:spcBef>
+              <a:spcAft>
+                <a:spcPct val="0"/>
+              </a:spcAft>
+              <a:defRPr>
+                <a:solidFill>
+                  <a:schemeClr val="tx1"/>
+                </a:solidFill>
+                <a:latin typeface="Calibri" panose="020F0502020204030204" pitchFamily="34" charset="0"/>
+              </a:defRPr>
+            </a:lvl8pPr>
+            <a:lvl9pPr marL="3886200" indent="-228600" eaLnBrk="0" fontAlgn="base" hangingPunct="0">
+              <a:spcBef>
+                <a:spcPct val="0"/>
+              </a:spcBef>
+              <a:spcAft>
+                <a:spcPct val="0"/>
+              </a:spcAft>
+              <a:defRPr>
+                <a:solidFill>
+                  <a:schemeClr val="tx1"/>
+                </a:solidFill>
+                <a:latin typeface="Calibri" panose="020F0502020204030204" pitchFamily="34" charset="0"/>
+              </a:defRPr>
+            </a:lvl9pPr>
+          </a:lstStyle>
+          <a:p>
+            <a:pPr algn="ctr" eaLnBrk="1" hangingPunct="1"/>
+            <a:r>
+              <a:rPr lang="en-US" altLang="en-US" sz="1200" dirty="0">
+                <a:latin typeface="Arial" panose="020B0604020202020204" pitchFamily="34" charset="0"/>
+                <a:ea typeface="Amazon Ember" panose="020B0603020204020204" pitchFamily="34" charset="0"/>
+                <a:cs typeface="Arial" panose="020B0604020202020204" pitchFamily="34" charset="0"/>
+              </a:rPr>
+              <a:t>AWS CloudFormation StackSets</a:t>
+            </a:r>
+          </a:p>
+        </p:txBody>
+      </p:sp>
+      <p:sp>
+        <p:nvSpPr>
+          <p:cNvPr id="51" name="Freeform 62">
+            <a:extLst>
+              <a:ext uri="{FF2B5EF4-FFF2-40B4-BE49-F238E27FC236}">
+                <a16:creationId xmlns:a16="http://schemas.microsoft.com/office/drawing/2014/main" id="{6C97284B-9E2E-4856-84D7-68039D42A955}"/>
               </a:ext>
             </a:extLst>
           </p:cNvPr>
@@ -12304,9 +12022,9 @@
           <p:nvPr/>
         </p:nvSpPr>
         <p:spPr>
-          <a:xfrm rot="16200000" flipH="1" flipV="1">
-            <a:off x="2823346" y="2493983"/>
-            <a:ext cx="1520887" cy="513979"/>
+          <a:xfrm rot="5400000">
+            <a:off x="3674418" y="2328877"/>
+            <a:ext cx="1663613" cy="773234"/>
           </a:xfrm>
           <a:custGeom>
             <a:avLst/>
@@ -12374,219 +12092,152 @@
           <a:bodyPr anchor="ctr"/>
           <a:lstStyle/>
           <a:p>
-            <a:pPr algn="ctr" eaLnBrk="1" fontAlgn="auto" hangingPunct="1">
-              <a:spcBef>
-                <a:spcPts val="0"/>
-              </a:spcBef>
-              <a:spcAft>
-                <a:spcPts val="0"/>
-              </a:spcAft>
+            <a:pPr algn="ctr">
               <a:defRPr/>
             </a:pPr>
-            <a:r>
-              <a:rPr lang="en-US" dirty="0"/>
-              <a:t>p</a:t>
-            </a:r>
+            <a:endParaRPr lang="en-US" dirty="0"/>
           </a:p>
         </p:txBody>
       </p:sp>
-      <p:pic>
-        <p:nvPicPr>
-          <p:cNvPr id="143" name="Graphic 142">
+      <p:cxnSp>
+        <p:nvCxnSpPr>
+          <p:cNvPr id="52" name="Straight Arrow Connector 51">
             <a:extLst>
               <a:ext uri="{FF2B5EF4-FFF2-40B4-BE49-F238E27FC236}">
-                <a16:creationId xmlns:a16="http://schemas.microsoft.com/office/drawing/2014/main" id="{EF2EDF4D-8DA7-413B-A99C-A29EC468E16F}"/>
+                <a16:creationId xmlns:a16="http://schemas.microsoft.com/office/drawing/2014/main" id="{EE68026F-08EE-40FF-B2F3-83A09D87156E}"/>
               </a:ext>
             </a:extLst>
           </p:cNvPr>
-          <p:cNvPicPr>
-            <a:picLocks noChangeAspect="1"/>
-          </p:cNvPicPr>
+          <p:cNvCxnSpPr>
+            <a:cxnSpLocks/>
+          </p:cNvCxnSpPr>
           <p:nvPr/>
-        </p:nvPicPr>
-        <p:blipFill>
-          <a:blip r:embed="rId19">
-            <a:extLst>
-              <a:ext uri="{96DAC541-7B7A-43D3-8B79-37D633B846F1}">
-                <asvg:svgBlip xmlns:asvg="http://schemas.microsoft.com/office/drawing/2016/SVG/main" r:embed="rId20"/>
-              </a:ext>
-            </a:extLst>
-          </a:blip>
-          <a:stretch>
-            <a:fillRect/>
-          </a:stretch>
-        </p:blipFill>
+        </p:nvCxnSpPr>
+        <p:spPr>
+          <a:xfrm flipV="1">
+            <a:off x="8843970" y="1848009"/>
+            <a:ext cx="0" cy="1671156"/>
+          </a:xfrm>
+          <a:prstGeom prst="straightConnector1">
+            <a:avLst/>
+          </a:prstGeom>
+          <a:ln w="15875">
+            <a:solidFill>
+              <a:schemeClr val="tx1"/>
+            </a:solidFill>
+            <a:headEnd type="none" w="med" len="sm"/>
+            <a:tailEnd type="arrow" w="med" len="sm"/>
+          </a:ln>
+        </p:spPr>
+        <p:style>
+          <a:lnRef idx="1">
+            <a:schemeClr val="accent1"/>
+          </a:lnRef>
+          <a:fillRef idx="0">
+            <a:schemeClr val="accent1"/>
+          </a:fillRef>
+          <a:effectRef idx="0">
+            <a:schemeClr val="accent1"/>
+          </a:effectRef>
+          <a:fontRef idx="minor">
+            <a:schemeClr val="tx1"/>
+          </a:fontRef>
+        </p:style>
+      </p:cxnSp>
+      <p:cxnSp>
+        <p:nvCxnSpPr>
+          <p:cNvPr id="67" name="Elbow Connector 46">
+            <a:extLst>
+              <a:ext uri="{FF2B5EF4-FFF2-40B4-BE49-F238E27FC236}">
+                <a16:creationId xmlns:a16="http://schemas.microsoft.com/office/drawing/2014/main" id="{675000F5-AFBC-4707-90E4-B21B45FC602D}"/>
+              </a:ext>
+            </a:extLst>
+          </p:cNvPr>
+          <p:cNvCxnSpPr>
+            <a:cxnSpLocks/>
+            <a:endCxn id="110" idx="0"/>
+          </p:cNvCxnSpPr>
+          <p:nvPr/>
+        </p:nvCxnSpPr>
         <p:spPr>
           <a:xfrm>
-            <a:off x="1036930" y="2865108"/>
-            <a:ext cx="457200" cy="457200"/>
-          </a:xfrm>
-          <a:prstGeom prst="rect">
+            <a:off x="7272338" y="795458"/>
+            <a:ext cx="4733257" cy="2026201"/>
+          </a:xfrm>
+          <a:prstGeom prst="bentConnector2">
             <a:avLst/>
           </a:prstGeom>
+          <a:ln w="15875">
+            <a:solidFill>
+              <a:schemeClr val="tx1"/>
+            </a:solidFill>
+            <a:headEnd type="arrow" w="med" len="sm"/>
+            <a:tailEnd type="none" w="med" len="sm"/>
+          </a:ln>
         </p:spPr>
-      </p:pic>
-      <p:sp>
-        <p:nvSpPr>
-          <p:cNvPr id="145" name="TextBox 11">
+        <p:style>
+          <a:lnRef idx="1">
+            <a:schemeClr val="accent1"/>
+          </a:lnRef>
+          <a:fillRef idx="0">
+            <a:schemeClr val="accent1"/>
+          </a:fillRef>
+          <a:effectRef idx="0">
+            <a:schemeClr val="accent1"/>
+          </a:effectRef>
+          <a:fontRef idx="minor">
+            <a:schemeClr val="tx1"/>
+          </a:fontRef>
+        </p:style>
+      </p:cxnSp>
+      <p:cxnSp>
+        <p:nvCxnSpPr>
+          <p:cNvPr id="72" name="Elbow Connector 46">
             <a:extLst>
               <a:ext uri="{FF2B5EF4-FFF2-40B4-BE49-F238E27FC236}">
-                <a16:creationId xmlns:a16="http://schemas.microsoft.com/office/drawing/2014/main" id="{AB85A129-3A6C-4800-96BA-333F30145C46}"/>
+                <a16:creationId xmlns:a16="http://schemas.microsoft.com/office/drawing/2014/main" id="{E838B3C8-2D77-4F80-AA1E-4136EFD2D5A3}"/>
               </a:ext>
             </a:extLst>
           </p:cNvPr>
-          <p:cNvSpPr txBox="1">
-            <a:spLocks noChangeArrowheads="1"/>
-          </p:cNvSpPr>
+          <p:cNvCxnSpPr>
+            <a:cxnSpLocks/>
+            <a:endCxn id="118" idx="1"/>
+          </p:cNvCxnSpPr>
           <p:nvPr/>
-        </p:nvSpPr>
-        <p:spPr bwMode="auto">
-          <a:xfrm>
-            <a:off x="302692" y="3336106"/>
-            <a:ext cx="1848463" cy="461665"/>
-          </a:xfrm>
-          <a:prstGeom prst="rect">
-            <a:avLst/>
+        </p:nvCxnSpPr>
+        <p:spPr>
+          <a:xfrm rot="10800000" flipV="1">
+            <a:off x="2109025" y="795458"/>
+            <a:ext cx="4327510" cy="2361543"/>
+          </a:xfrm>
+          <a:prstGeom prst="bentConnector3">
+            <a:avLst>
+              <a:gd name="adj1" fmla="val 116177"/>
+            </a:avLst>
           </a:prstGeom>
-          <a:noFill/>
-          <a:ln>
-            <a:noFill/>
+          <a:ln w="15875">
+            <a:solidFill>
+              <a:schemeClr val="tx1"/>
+            </a:solidFill>
+            <a:headEnd type="arrow" w="med" len="sm"/>
+            <a:tailEnd type="none" w="med" len="sm"/>
           </a:ln>
-          <a:extLst>
-            <a:ext uri="{909E8E84-426E-40DD-AFC4-6F175D3DCCD1}">
-              <a14:hiddenFill xmlns:a14="http://schemas.microsoft.com/office/drawing/2010/main">
-                <a:solidFill>
-                  <a:srgbClr val="FFFFFF"/>
-                </a:solidFill>
-              </a14:hiddenFill>
-            </a:ext>
-            <a:ext uri="{91240B29-F687-4F45-9708-019B960494DF}">
-              <a14:hiddenLine xmlns:a14="http://schemas.microsoft.com/office/drawing/2010/main" w="9525">
-                <a:solidFill>
-                  <a:srgbClr val="000000"/>
-                </a:solidFill>
-                <a:miter lim="800000"/>
-                <a:headEnd/>
-                <a:tailEnd/>
-              </a14:hiddenLine>
-            </a:ext>
-          </a:extLst>
         </p:spPr>
-        <p:txBody>
-          <a:bodyPr wrap="square">
-            <a:spAutoFit/>
-          </a:bodyPr>
-          <a:lstStyle>
-            <a:lvl1pPr>
-              <a:defRPr>
-                <a:solidFill>
-                  <a:schemeClr val="tx1"/>
-                </a:solidFill>
-                <a:latin typeface="Calibri" panose="020F0502020204030204" pitchFamily="34" charset="0"/>
-              </a:defRPr>
-            </a:lvl1pPr>
-            <a:lvl2pPr marL="742950" indent="-285750">
-              <a:defRPr>
-                <a:solidFill>
-                  <a:schemeClr val="tx1"/>
-                </a:solidFill>
-                <a:latin typeface="Calibri" panose="020F0502020204030204" pitchFamily="34" charset="0"/>
-              </a:defRPr>
-            </a:lvl2pPr>
-            <a:lvl3pPr marL="1143000" indent="-228600">
-              <a:defRPr>
-                <a:solidFill>
-                  <a:schemeClr val="tx1"/>
-                </a:solidFill>
-                <a:latin typeface="Calibri" panose="020F0502020204030204" pitchFamily="34" charset="0"/>
-              </a:defRPr>
-            </a:lvl3pPr>
-            <a:lvl4pPr marL="1600200" indent="-228600">
-              <a:defRPr>
-                <a:solidFill>
-                  <a:schemeClr val="tx1"/>
-                </a:solidFill>
-                <a:latin typeface="Calibri" panose="020F0502020204030204" pitchFamily="34" charset="0"/>
-              </a:defRPr>
-            </a:lvl4pPr>
-            <a:lvl5pPr marL="2057400" indent="-228600">
-              <a:defRPr>
-                <a:solidFill>
-                  <a:schemeClr val="tx1"/>
-                </a:solidFill>
-                <a:latin typeface="Calibri" panose="020F0502020204030204" pitchFamily="34" charset="0"/>
-              </a:defRPr>
-            </a:lvl5pPr>
-            <a:lvl6pPr marL="2514600" indent="-228600" eaLnBrk="0" fontAlgn="base" hangingPunct="0">
-              <a:spcBef>
-                <a:spcPct val="0"/>
-              </a:spcBef>
-              <a:spcAft>
-                <a:spcPct val="0"/>
-              </a:spcAft>
-              <a:defRPr>
-                <a:solidFill>
-                  <a:schemeClr val="tx1"/>
-                </a:solidFill>
-                <a:latin typeface="Calibri" panose="020F0502020204030204" pitchFamily="34" charset="0"/>
-              </a:defRPr>
-            </a:lvl6pPr>
-            <a:lvl7pPr marL="2971800" indent="-228600" eaLnBrk="0" fontAlgn="base" hangingPunct="0">
-              <a:spcBef>
-                <a:spcPct val="0"/>
-              </a:spcBef>
-              <a:spcAft>
-                <a:spcPct val="0"/>
-              </a:spcAft>
-              <a:defRPr>
-                <a:solidFill>
-                  <a:schemeClr val="tx1"/>
-                </a:solidFill>
-                <a:latin typeface="Calibri" panose="020F0502020204030204" pitchFamily="34" charset="0"/>
-              </a:defRPr>
-            </a:lvl7pPr>
-            <a:lvl8pPr marL="3429000" indent="-228600" eaLnBrk="0" fontAlgn="base" hangingPunct="0">
-              <a:spcBef>
-                <a:spcPct val="0"/>
-              </a:spcBef>
-              <a:spcAft>
-                <a:spcPct val="0"/>
-              </a:spcAft>
-              <a:defRPr>
-                <a:solidFill>
-                  <a:schemeClr val="tx1"/>
-                </a:solidFill>
-                <a:latin typeface="Calibri" panose="020F0502020204030204" pitchFamily="34" charset="0"/>
-              </a:defRPr>
-            </a:lvl8pPr>
-            <a:lvl9pPr marL="3886200" indent="-228600" eaLnBrk="0" fontAlgn="base" hangingPunct="0">
-              <a:spcBef>
-                <a:spcPct val="0"/>
-              </a:spcBef>
-              <a:spcAft>
-                <a:spcPct val="0"/>
-              </a:spcAft>
-              <a:defRPr>
-                <a:solidFill>
-                  <a:schemeClr val="tx1"/>
-                </a:solidFill>
-                <a:latin typeface="Calibri" panose="020F0502020204030204" pitchFamily="34" charset="0"/>
-              </a:defRPr>
-            </a:lvl9pPr>
-          </a:lstStyle>
-          <a:p>
-            <a:pPr algn="ctr" eaLnBrk="1" hangingPunct="1"/>
-            <a:r>
-              <a:rPr lang="en-US" altLang="en-US" sz="1200" dirty="0">
-                <a:latin typeface="Arial" panose="020B0604020202020204" pitchFamily="34" charset="0"/>
-                <a:ea typeface="Amazon Ember" panose="020B0603020204020204" pitchFamily="34" charset="0"/>
-                <a:cs typeface="Arial" panose="020B0604020202020204" pitchFamily="34" charset="0"/>
-              </a:rPr>
-              <a:t>AWS CloudFormation StackSets</a:t>
-            </a:r>
-          </a:p>
-        </p:txBody>
-      </p:sp>
+        <p:style>
+          <a:lnRef idx="1">
+            <a:schemeClr val="accent1"/>
+          </a:lnRef>
+          <a:fillRef idx="0">
+            <a:schemeClr val="accent1"/>
+          </a:fillRef>
+          <a:effectRef idx="0">
+            <a:schemeClr val="accent1"/>
+          </a:effectRef>
+          <a:fontRef idx="minor">
+            <a:schemeClr val="tx1"/>
+          </a:fontRef>
+        </p:style>
+      </p:cxnSp>
     </p:spTree>
     <p:extLst>
       <p:ext uri="{BB962C8B-B14F-4D97-AF65-F5344CB8AC3E}">
@@ -12603,7 +12254,7 @@
 <file path=ppt/theme/theme1.xml><?xml version="1.0" encoding="utf-8"?>
 <a:theme xmlns:a="http://schemas.openxmlformats.org/drawingml/2006/main" name="Office Theme">
   <a:themeElements>
-    <a:clrScheme name="Office">
+    <a:clrScheme name="Office Theme">
       <a:dk1>
         <a:sysClr val="windowText" lastClr="000000"/>
       </a:dk1>
@@ -12641,7 +12292,7 @@
         <a:srgbClr val="954F72"/>
       </a:folHlink>
     </a:clrScheme>
-    <a:fontScheme name="Office">
+    <a:fontScheme name="Office Theme">
       <a:majorFont>
         <a:latin typeface="Calibri Light" panose="020F0302020204030204"/>
         <a:ea typeface=""/>
@@ -12676,23 +12327,6 @@
         <a:font script="Viet" typeface="Times New Roman"/>
         <a:font script="Uigh" typeface="Microsoft Uighur"/>
         <a:font script="Geor" typeface="Sylfaen"/>
-        <a:font script="Armn" typeface="Arial"/>
-        <a:font script="Bugi" typeface="Leelawadee UI"/>
-        <a:font script="Bopo" typeface="Microsoft JhengHei"/>
-        <a:font script="Java" typeface="Javanese Text"/>
-        <a:font script="Lisu" typeface="Segoe UI"/>
-        <a:font script="Mymr" typeface="Myanmar Text"/>
-        <a:font script="Nkoo" typeface="Ebrima"/>
-        <a:font script="Olck" typeface="Nirmala UI"/>
-        <a:font script="Osma" typeface="Ebrima"/>
-        <a:font script="Phag" typeface="Phagspa"/>
-        <a:font script="Syrn" typeface="Estrangelo Edessa"/>
-        <a:font script="Syrj" typeface="Estrangelo Edessa"/>
-        <a:font script="Syre" typeface="Estrangelo Edessa"/>
-        <a:font script="Sora" typeface="Nirmala UI"/>
-        <a:font script="Tale" typeface="Microsoft Tai Le"/>
-        <a:font script="Talu" typeface="Microsoft New Tai Lue"/>
-        <a:font script="Tfng" typeface="Ebrima"/>
       </a:majorFont>
       <a:minorFont>
         <a:latin typeface="Calibri" panose="020F0502020204030204"/>
@@ -12728,26 +12362,9 @@
         <a:font script="Viet" typeface="Arial"/>
         <a:font script="Uigh" typeface="Microsoft Uighur"/>
         <a:font script="Geor" typeface="Sylfaen"/>
-        <a:font script="Armn" typeface="Arial"/>
-        <a:font script="Bugi" typeface="Leelawadee UI"/>
-        <a:font script="Bopo" typeface="Microsoft JhengHei"/>
-        <a:font script="Java" typeface="Javanese Text"/>
-        <a:font script="Lisu" typeface="Segoe UI"/>
-        <a:font script="Mymr" typeface="Myanmar Text"/>
-        <a:font script="Nkoo" typeface="Ebrima"/>
-        <a:font script="Olck" typeface="Nirmala UI"/>
-        <a:font script="Osma" typeface="Ebrima"/>
-        <a:font script="Phag" typeface="Phagspa"/>
-        <a:font script="Syrn" typeface="Estrangelo Edessa"/>
-        <a:font script="Syrj" typeface="Estrangelo Edessa"/>
-        <a:font script="Syre" typeface="Estrangelo Edessa"/>
-        <a:font script="Sora" typeface="Nirmala UI"/>
-        <a:font script="Tale" typeface="Microsoft Tai Le"/>
-        <a:font script="Talu" typeface="Microsoft New Tai Lue"/>
-        <a:font script="Tfng" typeface="Ebrima"/>
       </a:minorFont>
     </a:fontScheme>
-    <a:fmtScheme name="Office">
+    <a:fmtScheme name="Office Theme">
       <a:fillStyleLst>
         <a:solidFill>
           <a:schemeClr val="phClr"/>

</xml_diff>

<commit_message>
TW edits to text and diagram - round 3
</commit_message>
<xml_diff>
--- a/guide/content/images/abi-crowdstrike-architecture-diagram.pptx
+++ b/guide/content/images/abi-crowdstrike-architecture-diagram.pptx
@@ -9876,7 +9876,7 @@
         </p:blipFill>
         <p:spPr>
           <a:xfrm>
-            <a:off x="9139573" y="2400320"/>
+            <a:off x="9139573" y="2375935"/>
             <a:ext cx="381000" cy="381000"/>
           </a:xfrm>
           <a:prstGeom prst="rect">
@@ -10544,8 +10544,8 @@
         </p:nvSpPr>
         <p:spPr bwMode="auto">
           <a:xfrm>
-            <a:off x="3268297" y="5301024"/>
-            <a:ext cx="1023077" cy="461665"/>
+            <a:off x="3001977" y="5325320"/>
+            <a:ext cx="1624545" cy="461665"/>
           </a:xfrm>
           <a:prstGeom prst="rect">
             <a:avLst/>
@@ -10684,7 +10684,22 @@
                 <a:ea typeface="Amazon Ember" panose="020B0603020204020204" pitchFamily="34" charset="0"/>
                 <a:cs typeface="Arial" panose="020B0604020202020204" pitchFamily="34" charset="0"/>
               </a:rPr>
-              <a:t>CrowdStrike API secret</a:t>
+              <a:t>Secrets Manager </a:t>
+            </a:r>
+            <a:br>
+              <a:rPr lang="en-US" altLang="en-US" sz="1200" dirty="0">
+                <a:latin typeface="Arial" panose="020B0604020202020204" pitchFamily="34" charset="0"/>
+                <a:ea typeface="Amazon Ember" panose="020B0603020204020204" pitchFamily="34" charset="0"/>
+                <a:cs typeface="Arial" panose="020B0604020202020204" pitchFamily="34" charset="0"/>
+              </a:rPr>
+            </a:br>
+            <a:r>
+              <a:rPr lang="en-US" altLang="en-US" sz="1200" dirty="0">
+                <a:latin typeface="Arial" panose="020B0604020202020204" pitchFamily="34" charset="0"/>
+                <a:ea typeface="Amazon Ember" panose="020B0603020204020204" pitchFamily="34" charset="0"/>
+                <a:cs typeface="Arial" panose="020B0604020202020204" pitchFamily="34" charset="0"/>
+              </a:rPr>
+              <a:t>API secret</a:t>
             </a:r>
           </a:p>
         </p:txBody>
@@ -11013,7 +11028,7 @@
         </p:blipFill>
         <p:spPr bwMode="auto">
           <a:xfrm>
-            <a:off x="3405347" y="4507674"/>
+            <a:off x="3433250" y="4494077"/>
             <a:ext cx="762000" cy="762000"/>
           </a:xfrm>
           <a:prstGeom prst="rect">
@@ -12004,7 +12019,7 @@
                 <a:ea typeface="Amazon Ember" panose="020B0603020204020204" pitchFamily="34" charset="0"/>
                 <a:cs typeface="Arial" panose="020B0604020202020204" pitchFamily="34" charset="0"/>
               </a:rPr>
-              <a:t>AWS CloudFormation StackSets</a:t>
+              <a:t>CloudFormation StackSets</a:t>
             </a:r>
           </a:p>
         </p:txBody>

</xml_diff>